<commit_message>
Schur-Parlett slides updated (final?).
</commit_message>
<xml_diff>
--- a/docs/slides pd2ggaln/MatFun.pptx
+++ b/docs/slides pd2ggaln/MatFun.pptx
@@ -5,10 +5,10 @@
     <p:sldMasterId id="2147483648" r:id="rId1"/>
   </p:sldMasterIdLst>
   <p:notesMasterIdLst>
-    <p:notesMasterId r:id="rId16"/>
+    <p:notesMasterId r:id="rId15"/>
   </p:notesMasterIdLst>
   <p:handoutMasterIdLst>
-    <p:handoutMasterId r:id="rId17"/>
+    <p:handoutMasterId r:id="rId16"/>
   </p:handoutMasterIdLst>
   <p:sldIdLst>
     <p:sldId id="256" r:id="rId2"/>
@@ -16,15 +16,14 @@
     <p:sldId id="273" r:id="rId4"/>
     <p:sldId id="274" r:id="rId5"/>
     <p:sldId id="275" r:id="rId6"/>
-    <p:sldId id="276" r:id="rId7"/>
+    <p:sldId id="269" r:id="rId7"/>
     <p:sldId id="280" r:id="rId8"/>
     <p:sldId id="281" r:id="rId9"/>
     <p:sldId id="278" r:id="rId10"/>
     <p:sldId id="279" r:id="rId11"/>
-    <p:sldId id="269" r:id="rId12"/>
-    <p:sldId id="271" r:id="rId13"/>
-    <p:sldId id="258" r:id="rId14"/>
-    <p:sldId id="260" r:id="rId15"/>
+    <p:sldId id="271" r:id="rId12"/>
+    <p:sldId id="258" r:id="rId13"/>
+    <p:sldId id="260" r:id="rId14"/>
   </p:sldIdLst>
   <p:sldSz cx="12188825" cy="6858000"/>
   <p:notesSz cx="6858000" cy="9144000"/>
@@ -321,11 +320,11 @@
         </c:dLbls>
         <c:gapWidth val="150"/>
         <c:overlap val="100"/>
-        <c:axId val="152265488"/>
-        <c:axId val="156115104"/>
+        <c:axId val="153140896"/>
+        <c:axId val="61168864"/>
       </c:barChart>
       <c:catAx>
-        <c:axId val="152265488"/>
+        <c:axId val="153140896"/>
         <c:scaling>
           <c:orientation val="minMax"/>
         </c:scaling>
@@ -365,7 +364,7 @@
             <a:endParaRPr lang="it-IT"/>
           </a:p>
         </c:txPr>
-        <c:crossAx val="156115104"/>
+        <c:crossAx val="61168864"/>
         <c:crosses val="autoZero"/>
         <c:auto val="1"/>
         <c:lblAlgn val="ctr"/>
@@ -373,7 +372,7 @@
         <c:noMultiLvlLbl val="0"/>
       </c:catAx>
       <c:valAx>
-        <c:axId val="156115104"/>
+        <c:axId val="61168864"/>
         <c:scaling>
           <c:orientation val="minMax"/>
         </c:scaling>
@@ -397,7 +396,7 @@
         <c:majorTickMark val="none"/>
         <c:minorTickMark val="none"/>
         <c:tickLblPos val="nextTo"/>
-        <c:crossAx val="152265488"/>
+        <c:crossAx val="153140896"/>
         <c:crosses val="autoZero"/>
         <c:crossBetween val="between"/>
       </c:valAx>
@@ -4227,7 +4226,7 @@
           <a:p>
             <a:fld id="{BDB7646E-8811-423A-9C42-2CBFADA00A96}" type="datetimeFigureOut">
               <a:rPr lang="en-US" smtClean="0"/>
-              <a:t>1/29/2018</a:t>
+              <a:t>1/31/2018</a:t>
             </a:fld>
             <a:endParaRPr lang="en-US"/>
           </a:p>
@@ -4401,7 +4400,7 @@
             <a:fld id="{D677E230-58DD-43ED-96A1-552DDAB53532}" type="datetimeFigureOut">
               <a:rPr lang="en-US" smtClean="0"/>
               <a:pPr/>
-              <a:t>1/29/2018</a:t>
+              <a:t>1/31/2018</a:t>
             </a:fld>
             <a:endParaRPr lang="en-US"/>
           </a:p>
@@ -5594,7 +5593,7 @@
             <a:fld id="{C2C6F8EA-316C-41DE-B9A4-EDCC3A85ED9A}" type="datetimeFigureOut">
               <a:rPr lang="en-US" smtClean="0"/>
               <a:pPr/>
-              <a:t>1/29/2018</a:t>
+              <a:t>1/31/2018</a:t>
             </a:fld>
             <a:endParaRPr lang="en-US" dirty="0"/>
           </a:p>
@@ -5818,7 +5817,7 @@
           <a:p>
             <a:fld id="{C2C6F8EA-316C-41DE-B9A4-EDCC3A85ED9A}" type="datetimeFigureOut">
               <a:rPr lang="en-US"/>
-              <a:t>1/29/2018</a:t>
+              <a:t>1/31/2018</a:t>
             </a:fld>
             <a:endParaRPr/>
           </a:p>
@@ -6637,7 +6636,7 @@
           <a:p>
             <a:fld id="{C2C6F8EA-316C-41DE-B9A4-EDCC3A85ED9A}" type="datetimeFigureOut">
               <a:rPr lang="en-US"/>
-              <a:t>1/29/2018</a:t>
+              <a:t>1/31/2018</a:t>
             </a:fld>
             <a:endParaRPr/>
           </a:p>
@@ -6839,7 +6838,7 @@
           <a:p>
             <a:fld id="{C2C6F8EA-316C-41DE-B9A4-EDCC3A85ED9A}" type="datetimeFigureOut">
               <a:rPr lang="en-US"/>
-              <a:t>1/29/2018</a:t>
+              <a:t>1/31/2018</a:t>
             </a:fld>
             <a:endParaRPr dirty="0"/>
           </a:p>
@@ -8106,7 +8105,7 @@
             <a:fld id="{C2C6F8EA-316C-41DE-B9A4-EDCC3A85ED9A}" type="datetimeFigureOut">
               <a:rPr lang="en-US" smtClean="0"/>
               <a:pPr/>
-              <a:t>1/29/2018</a:t>
+              <a:t>1/31/2018</a:t>
             </a:fld>
             <a:endParaRPr lang="en-US" dirty="0"/>
           </a:p>
@@ -8432,7 +8431,7 @@
           <a:p>
             <a:fld id="{C2C6F8EA-316C-41DE-B9A4-EDCC3A85ED9A}" type="datetimeFigureOut">
               <a:rPr lang="en-US"/>
-              <a:t>1/29/2018</a:t>
+              <a:t>1/31/2018</a:t>
             </a:fld>
             <a:endParaRPr/>
           </a:p>
@@ -8884,7 +8883,7 @@
           <a:p>
             <a:fld id="{C2C6F8EA-316C-41DE-B9A4-EDCC3A85ED9A}" type="datetimeFigureOut">
               <a:rPr lang="en-US"/>
-              <a:t>1/29/2018</a:t>
+              <a:t>1/31/2018</a:t>
             </a:fld>
             <a:endParaRPr/>
           </a:p>
@@ -9018,7 +9017,7 @@
           <a:p>
             <a:fld id="{C2C6F8EA-316C-41DE-B9A4-EDCC3A85ED9A}" type="datetimeFigureOut">
               <a:rPr lang="en-US"/>
-              <a:t>1/29/2018</a:t>
+              <a:t>1/31/2018</a:t>
             </a:fld>
             <a:endParaRPr/>
           </a:p>
@@ -9357,7 +9356,7 @@
           <a:p>
             <a:fld id="{C2C6F8EA-316C-41DE-B9A4-EDCC3A85ED9A}" type="datetimeFigureOut">
               <a:rPr lang="en-US"/>
-              <a:t>1/29/2018</a:t>
+              <a:t>1/31/2018</a:t>
             </a:fld>
             <a:endParaRPr/>
           </a:p>
@@ -9853,7 +9852,7 @@
           <a:p>
             <a:fld id="{C2C6F8EA-316C-41DE-B9A4-EDCC3A85ED9A}" type="datetimeFigureOut">
               <a:rPr lang="en-US"/>
-              <a:t>1/29/2018</a:t>
+              <a:t>1/31/2018</a:t>
             </a:fld>
             <a:endParaRPr/>
           </a:p>
@@ -10306,7 +10305,7 @@
             <a:fld id="{C2C6F8EA-316C-41DE-B9A4-EDCC3A85ED9A}" type="datetimeFigureOut">
               <a:rPr lang="en-US" smtClean="0"/>
               <a:pPr/>
-              <a:t>1/29/2018</a:t>
+              <a:t>1/31/2018</a:t>
             </a:fld>
             <a:endParaRPr lang="en-US" dirty="0"/>
           </a:p>
@@ -11209,7 +11208,7 @@
             <a:fld id="{C2C6F8EA-316C-41DE-B9A4-EDCC3A85ED9A}" type="datetimeFigureOut">
               <a:rPr lang="en-US" smtClean="0"/>
               <a:pPr/>
-              <a:t>1/29/2018</a:t>
+              <a:t>1/31/2018</a:t>
             </a:fld>
             <a:endParaRPr lang="en-US" dirty="0"/>
           </a:p>
@@ -11911,7 +11910,7 @@
           <a:p>
             <a:r>
               <a:rPr lang="en-US"/>
-              <a:t>Two Content Layout with Table</a:t>
+              <a:t>Two Content Layout with SmartArt</a:t>
             </a:r>
             <a:endParaRPr lang="en-US" dirty="0"/>
           </a:p>
@@ -11919,7 +11918,7 @@
       </p:sp>
       <p:graphicFrame>
         <p:nvGraphicFramePr>
-          <p:cNvPr id="11" name="Content Placeholder 10"/>
+          <p:cNvPr id="6" name="Content Placeholder 5" descr="Vertical Chevron List diagram showing 3 groups arranged one below the other with bullet pointed tasks in each group"/>
           <p:cNvGraphicFramePr>
             <a:graphicFrameLocks noGrp="1"/>
           </p:cNvGraphicFramePr>
@@ -11927,237 +11926,18 @@
             <p:ph sz="half" idx="1"/>
             <p:extLst>
               <p:ext uri="{D42A27DB-BD31-4B8C-83A1-F6EECF244321}">
-                <p14:modId xmlns:p14="http://schemas.microsoft.com/office/powerpoint/2010/main" val="1699548788"/>
+                <p14:modId xmlns:p14="http://schemas.microsoft.com/office/powerpoint/2010/main" val="3739683335"/>
               </p:ext>
             </p:extLst>
           </p:nvPr>
         </p:nvGraphicFramePr>
         <p:xfrm>
           <a:off x="1593850" y="1600200"/>
-          <a:ext cx="4814889" cy="2209800"/>
+          <a:ext cx="4814888" cy="4572000"/>
         </p:xfrm>
         <a:graphic>
-          <a:graphicData uri="http://schemas.openxmlformats.org/drawingml/2006/table">
-            <a:tbl>
-              <a:tblPr firstRow="1" bandRow="1">
-                <a:tableStyleId>{073A0DAA-6AF3-43AB-8588-CEC1D06C72B9}</a:tableStyleId>
-              </a:tblPr>
-              <a:tblGrid>
-                <a:gridCol w="1604963">
-                  <a:extLst>
-                    <a:ext uri="{9D8B030D-6E8A-4147-A177-3AD203B41FA5}">
-                      <a16:colId xmlns:a16="http://schemas.microsoft.com/office/drawing/2014/main" xmlns="" val="20000"/>
-                    </a:ext>
-                  </a:extLst>
-                </a:gridCol>
-                <a:gridCol w="1604963">
-                  <a:extLst>
-                    <a:ext uri="{9D8B030D-6E8A-4147-A177-3AD203B41FA5}">
-                      <a16:colId xmlns:a16="http://schemas.microsoft.com/office/drawing/2014/main" xmlns="" val="20001"/>
-                    </a:ext>
-                  </a:extLst>
-                </a:gridCol>
-                <a:gridCol w="1604963">
-                  <a:extLst>
-                    <a:ext uri="{9D8B030D-6E8A-4147-A177-3AD203B41FA5}">
-                      <a16:colId xmlns:a16="http://schemas.microsoft.com/office/drawing/2014/main" xmlns="" val="20002"/>
-                    </a:ext>
-                  </a:extLst>
-                </a:gridCol>
-              </a:tblGrid>
-              <a:tr h="552450">
-                <a:tc>
-                  <a:txBody>
-                    <a:bodyPr/>
-                    <a:lstStyle/>
-                    <a:p>
-                      <a:r>
-                        <a:rPr lang="en-US" dirty="0"/>
-                        <a:t>Class</a:t>
-                      </a:r>
-                    </a:p>
-                  </a:txBody>
-                  <a:tcPr anchor="ctr"/>
-                </a:tc>
-                <a:tc>
-                  <a:txBody>
-                    <a:bodyPr/>
-                    <a:lstStyle/>
-                    <a:p>
-                      <a:pPr algn="ctr"/>
-                      <a:r>
-                        <a:rPr lang="en-US" dirty="0"/>
-                        <a:t>Group A</a:t>
-                      </a:r>
-                    </a:p>
-                  </a:txBody>
-                  <a:tcPr anchor="ctr"/>
-                </a:tc>
-                <a:tc>
-                  <a:txBody>
-                    <a:bodyPr/>
-                    <a:lstStyle/>
-                    <a:p>
-                      <a:pPr algn="ctr"/>
-                      <a:r>
-                        <a:rPr lang="en-US" dirty="0"/>
-                        <a:t>Group B</a:t>
-                      </a:r>
-                    </a:p>
-                  </a:txBody>
-                  <a:tcPr anchor="ctr"/>
-                </a:tc>
-                <a:extLst>
-                  <a:ext uri="{0D108BD9-81ED-4DB2-BD59-A6C34878D82A}">
-                    <a16:rowId xmlns:a16="http://schemas.microsoft.com/office/drawing/2014/main" xmlns="" val="10000"/>
-                  </a:ext>
-                </a:extLst>
-              </a:tr>
-              <a:tr h="552450">
-                <a:tc>
-                  <a:txBody>
-                    <a:bodyPr/>
-                    <a:lstStyle/>
-                    <a:p>
-                      <a:r>
-                        <a:rPr lang="en-US" dirty="0"/>
-                        <a:t>Class 1</a:t>
-                      </a:r>
-                    </a:p>
-                  </a:txBody>
-                  <a:tcPr anchor="ctr"/>
-                </a:tc>
-                <a:tc>
-                  <a:txBody>
-                    <a:bodyPr/>
-                    <a:lstStyle/>
-                    <a:p>
-                      <a:pPr algn="ctr"/>
-                      <a:r>
-                        <a:rPr lang="en-US" dirty="0"/>
-                        <a:t>82</a:t>
-                      </a:r>
-                    </a:p>
-                  </a:txBody>
-                  <a:tcPr anchor="ctr"/>
-                </a:tc>
-                <a:tc>
-                  <a:txBody>
-                    <a:bodyPr/>
-                    <a:lstStyle/>
-                    <a:p>
-                      <a:pPr algn="ctr"/>
-                      <a:r>
-                        <a:rPr lang="en-US" dirty="0"/>
-                        <a:t>95</a:t>
-                      </a:r>
-                    </a:p>
-                  </a:txBody>
-                  <a:tcPr anchor="ctr"/>
-                </a:tc>
-                <a:extLst>
-                  <a:ext uri="{0D108BD9-81ED-4DB2-BD59-A6C34878D82A}">
-                    <a16:rowId xmlns:a16="http://schemas.microsoft.com/office/drawing/2014/main" xmlns="" val="10001"/>
-                  </a:ext>
-                </a:extLst>
-              </a:tr>
-              <a:tr h="552450">
-                <a:tc>
-                  <a:txBody>
-                    <a:bodyPr/>
-                    <a:lstStyle/>
-                    <a:p>
-                      <a:r>
-                        <a:rPr lang="en-US" dirty="0"/>
-                        <a:t>Class 2</a:t>
-                      </a:r>
-                    </a:p>
-                  </a:txBody>
-                  <a:tcPr anchor="ctr"/>
-                </a:tc>
-                <a:tc>
-                  <a:txBody>
-                    <a:bodyPr/>
-                    <a:lstStyle/>
-                    <a:p>
-                      <a:pPr algn="ctr"/>
-                      <a:r>
-                        <a:rPr lang="en-US" dirty="0"/>
-                        <a:t>76</a:t>
-                      </a:r>
-                    </a:p>
-                  </a:txBody>
-                  <a:tcPr anchor="ctr"/>
-                </a:tc>
-                <a:tc>
-                  <a:txBody>
-                    <a:bodyPr/>
-                    <a:lstStyle/>
-                    <a:p>
-                      <a:pPr algn="ctr"/>
-                      <a:r>
-                        <a:rPr lang="en-US" dirty="0"/>
-                        <a:t>88</a:t>
-                      </a:r>
-                    </a:p>
-                  </a:txBody>
-                  <a:tcPr anchor="ctr"/>
-                </a:tc>
-                <a:extLst>
-                  <a:ext uri="{0D108BD9-81ED-4DB2-BD59-A6C34878D82A}">
-                    <a16:rowId xmlns:a16="http://schemas.microsoft.com/office/drawing/2014/main" xmlns="" val="10002"/>
-                  </a:ext>
-                </a:extLst>
-              </a:tr>
-              <a:tr h="552450">
-                <a:tc>
-                  <a:txBody>
-                    <a:bodyPr/>
-                    <a:lstStyle/>
-                    <a:p>
-                      <a:r>
-                        <a:rPr lang="en-US" dirty="0"/>
-                        <a:t>Class 3</a:t>
-                      </a:r>
-                    </a:p>
-                  </a:txBody>
-                  <a:tcPr anchor="ctr"/>
-                </a:tc>
-                <a:tc>
-                  <a:txBody>
-                    <a:bodyPr/>
-                    <a:lstStyle/>
-                    <a:p>
-                      <a:pPr algn="ctr"/>
-                      <a:r>
-                        <a:rPr lang="en-US" dirty="0"/>
-                        <a:t>84</a:t>
-                      </a:r>
-                    </a:p>
-                  </a:txBody>
-                  <a:tcPr anchor="ctr"/>
-                </a:tc>
-                <a:tc>
-                  <a:txBody>
-                    <a:bodyPr/>
-                    <a:lstStyle/>
-                    <a:p>
-                      <a:pPr algn="ctr"/>
-                      <a:r>
-                        <a:rPr lang="en-US" dirty="0"/>
-                        <a:t>90</a:t>
-                      </a:r>
-                    </a:p>
-                  </a:txBody>
-                  <a:tcPr anchor="ctr"/>
-                </a:tc>
-                <a:extLst>
-                  <a:ext uri="{0D108BD9-81ED-4DB2-BD59-A6C34878D82A}">
-                    <a16:rowId xmlns:a16="http://schemas.microsoft.com/office/drawing/2014/main" xmlns="" val="10003"/>
-                  </a:ext>
-                </a:extLst>
-              </a:tr>
-            </a:tbl>
+          <a:graphicData uri="http://schemas.openxmlformats.org/drawingml/2006/diagram">
+            <dgm:relIds xmlns:dgm="http://schemas.openxmlformats.org/drawingml/2006/diagram" xmlns:r="http://schemas.openxmlformats.org/officeDocument/2006/relationships" r:dm="rId2" r:lo="rId3" r:qs="rId4" r:cs="rId5"/>
           </a:graphicData>
         </a:graphic>
       </p:graphicFrame>
@@ -12177,29 +11957,28 @@
           <a:lstStyle/>
           <a:p>
             <a:r>
-              <a:rPr lang="en-US"/>
+              <a:rPr lang="en-US" dirty="0"/>
               <a:t>First bullet point here</a:t>
             </a:r>
           </a:p>
           <a:p>
             <a:r>
-              <a:rPr lang="en-US"/>
+              <a:rPr lang="en-US" dirty="0"/>
               <a:t>Second bullet point here</a:t>
             </a:r>
           </a:p>
           <a:p>
             <a:r>
-              <a:rPr lang="en-US"/>
+              <a:rPr lang="en-US" dirty="0"/>
               <a:t>Third bullet point here</a:t>
             </a:r>
-            <a:endParaRPr lang="en-US" dirty="0"/>
           </a:p>
         </p:txBody>
       </p:sp>
     </p:spTree>
     <p:extLst>
       <p:ext uri="{BB962C8B-B14F-4D97-AF65-F5344CB8AC3E}">
-        <p14:creationId xmlns:p14="http://schemas.microsoft.com/office/powerpoint/2010/main" val="2593339164"/>
+        <p14:creationId xmlns:p14="http://schemas.microsoft.com/office/powerpoint/2010/main" val="513726968"/>
       </p:ext>
     </p:extLst>
   </p:cSld>
@@ -12273,149 +12052,6 @@
           <a:p>
             <a:r>
               <a:rPr lang="en-US"/>
-              <a:t>Two Content Layout with SmartArt</a:t>
-            </a:r>
-            <a:endParaRPr lang="en-US" dirty="0"/>
-          </a:p>
-        </p:txBody>
-      </p:sp>
-      <p:graphicFrame>
-        <p:nvGraphicFramePr>
-          <p:cNvPr id="6" name="Content Placeholder 5" descr="Vertical Chevron List diagram showing 3 groups arranged one below the other with bullet pointed tasks in each group"/>
-          <p:cNvGraphicFramePr>
-            <a:graphicFrameLocks noGrp="1"/>
-          </p:cNvGraphicFramePr>
-          <p:nvPr>
-            <p:ph sz="half" idx="1"/>
-            <p:extLst>
-              <p:ext uri="{D42A27DB-BD31-4B8C-83A1-F6EECF244321}">
-                <p14:modId xmlns:p14="http://schemas.microsoft.com/office/powerpoint/2010/main" val="3739683335"/>
-              </p:ext>
-            </p:extLst>
-          </p:nvPr>
-        </p:nvGraphicFramePr>
-        <p:xfrm>
-          <a:off x="1593850" y="1600200"/>
-          <a:ext cx="4814888" cy="4572000"/>
-        </p:xfrm>
-        <a:graphic>
-          <a:graphicData uri="http://schemas.openxmlformats.org/drawingml/2006/diagram">
-            <dgm:relIds xmlns:dgm="http://schemas.openxmlformats.org/drawingml/2006/diagram" xmlns:r="http://schemas.openxmlformats.org/officeDocument/2006/relationships" r:dm="rId2" r:lo="rId3" r:qs="rId4" r:cs="rId5"/>
-          </a:graphicData>
-        </a:graphic>
-      </p:graphicFrame>
-      <p:sp>
-        <p:nvSpPr>
-          <p:cNvPr id="7" name="Content Placeholder 6"/>
-          <p:cNvSpPr>
-            <a:spLocks noGrp="1"/>
-          </p:cNvSpPr>
-          <p:nvPr>
-            <p:ph sz="half" idx="2"/>
-          </p:nvPr>
-        </p:nvSpPr>
-        <p:spPr/>
-        <p:txBody>
-          <a:bodyPr/>
-          <a:lstStyle/>
-          <a:p>
-            <a:r>
-              <a:rPr lang="en-US"/>
-              <a:t>First bullet point here</a:t>
-            </a:r>
-          </a:p>
-          <a:p>
-            <a:r>
-              <a:rPr lang="en-US"/>
-              <a:t>Second bullet point here</a:t>
-            </a:r>
-          </a:p>
-          <a:p>
-            <a:r>
-              <a:rPr lang="en-US"/>
-              <a:t>Third bullet point here</a:t>
-            </a:r>
-            <a:endParaRPr lang="en-US" dirty="0"/>
-          </a:p>
-        </p:txBody>
-      </p:sp>
-    </p:spTree>
-    <p:extLst>
-      <p:ext uri="{BB962C8B-B14F-4D97-AF65-F5344CB8AC3E}">
-        <p14:creationId xmlns:p14="http://schemas.microsoft.com/office/powerpoint/2010/main" val="513726968"/>
-      </p:ext>
-    </p:extLst>
-  </p:cSld>
-  <p:clrMapOvr>
-    <a:masterClrMapping/>
-  </p:clrMapOvr>
-  <mc:AlternateContent xmlns:mc="http://schemas.openxmlformats.org/markup-compatibility/2006" xmlns:p14="http://schemas.microsoft.com/office/powerpoint/2010/main">
-    <mc:Choice Requires="p14">
-      <p:transition spd="med" p14:dur="700">
-        <p:fade/>
-      </p:transition>
-    </mc:Choice>
-    <mc:Fallback xmlns="">
-      <p:transition spd="med">
-        <p:fade/>
-      </p:transition>
-    </mc:Fallback>
-  </mc:AlternateContent>
-  <p:timing>
-    <p:tnLst>
-      <p:par>
-        <p:cTn id="1" dur="indefinite" restart="never" nodeType="tmRoot"/>
-      </p:par>
-    </p:tnLst>
-  </p:timing>
-</p:sld>
-</file>
-
-<file path=ppt/slides/slide13.xml><?xml version="1.0" encoding="utf-8"?>
-<p:sld xmlns:a="http://schemas.openxmlformats.org/drawingml/2006/main" xmlns:r="http://schemas.openxmlformats.org/officeDocument/2006/relationships" xmlns:p="http://schemas.openxmlformats.org/presentationml/2006/main">
-  <p:cSld>
-    <p:bg>
-      <p:bgPr>
-        <a:solidFill>
-          <a:schemeClr val="accent3">
-            <a:lumMod val="40000"/>
-            <a:lumOff val="60000"/>
-          </a:schemeClr>
-        </a:solidFill>
-        <a:effectLst/>
-      </p:bgPr>
-    </p:bg>
-    <p:spTree>
-      <p:nvGrpSpPr>
-        <p:cNvPr id="1" name=""/>
-        <p:cNvGrpSpPr/>
-        <p:nvPr/>
-      </p:nvGrpSpPr>
-      <p:grpSpPr>
-        <a:xfrm>
-          <a:off x="0" y="0"/>
-          <a:ext cx="0" cy="0"/>
-          <a:chOff x="0" y="0"/>
-          <a:chExt cx="0" cy="0"/>
-        </a:xfrm>
-      </p:grpSpPr>
-      <p:sp>
-        <p:nvSpPr>
-          <p:cNvPr id="2" name="Title 1"/>
-          <p:cNvSpPr>
-            <a:spLocks noGrp="1"/>
-          </p:cNvSpPr>
-          <p:nvPr>
-            <p:ph type="title"/>
-          </p:nvPr>
-        </p:nvSpPr>
-        <p:spPr/>
-        <p:txBody>
-          <a:bodyPr/>
-          <a:lstStyle/>
-          <a:p>
-            <a:r>
-              <a:rPr lang="en-US"/>
               <a:t>Add a Slide Title - 1</a:t>
             </a:r>
             <a:endParaRPr lang="en-US" dirty="0"/>
@@ -12473,7 +12109,7 @@
 </p:sld>
 </file>
 
-<file path=ppt/slides/slide14.xml><?xml version="1.0" encoding="utf-8"?>
+<file path=ppt/slides/slide13.xml><?xml version="1.0" encoding="utf-8"?>
 <p:sld xmlns:a="http://schemas.openxmlformats.org/drawingml/2006/main" xmlns:r="http://schemas.openxmlformats.org/officeDocument/2006/relationships" xmlns:p="http://schemas.openxmlformats.org/presentationml/2006/main">
   <p:cSld>
     <p:bg>
@@ -14963,7 +14599,7 @@
       </p:grpSpPr>
       <p:sp>
         <p:nvSpPr>
-          <p:cNvPr id="13" name="Title 12"/>
+          <p:cNvPr id="2" name="Title 1"/>
           <p:cNvSpPr>
             <a:spLocks noGrp="1"/>
           </p:cNvSpPr>
@@ -14971,101 +14607,709 @@
             <p:ph type="title"/>
           </p:nvPr>
         </p:nvSpPr>
-        <p:spPr/>
+        <p:spPr>
+          <a:xfrm>
+            <a:off x="1593436" y="-208215"/>
+            <a:ext cx="9782801" cy="1239837"/>
+          </a:xfrm>
+        </p:spPr>
         <p:txBody>
           <a:bodyPr/>
           <a:lstStyle/>
           <a:p>
             <a:r>
-              <a:rPr lang="en-US" dirty="0" err="1" smtClean="0"/>
+              <a:rPr lang="en-US" dirty="0" err="1"/>
               <a:t>Schur-Parlett</a:t>
             </a:r>
             <a:r>
-              <a:rPr lang="en-US" dirty="0" smtClean="0"/>
+              <a:rPr lang="en-US" dirty="0"/>
               <a:t> – numerical accuracy</a:t>
             </a:r>
-            <a:endParaRPr lang="en-US" dirty="0"/>
           </a:p>
         </p:txBody>
       </p:sp>
-      <mc:AlternateContent xmlns:mc="http://schemas.openxmlformats.org/markup-compatibility/2006" xmlns:a14="http://schemas.microsoft.com/office/drawing/2010/main">
-        <mc:Choice Requires="a14">
+      <p:graphicFrame>
+        <p:nvGraphicFramePr>
+          <p:cNvPr id="11" name="Content Placeholder 10"/>
+          <p:cNvGraphicFramePr>
+            <a:graphicFrameLocks noGrp="1"/>
+          </p:cNvGraphicFramePr>
+          <p:nvPr>
+            <p:ph sz="half" idx="1"/>
+            <p:extLst>
+              <p:ext uri="{D42A27DB-BD31-4B8C-83A1-F6EECF244321}">
+                <p14:modId xmlns:p14="http://schemas.microsoft.com/office/powerpoint/2010/main" val="3918698755"/>
+              </p:ext>
+            </p:extLst>
+          </p:nvPr>
+        </p:nvGraphicFramePr>
+        <p:xfrm>
+          <a:off x="7606277" y="2761603"/>
+          <a:ext cx="3925215" cy="2297430"/>
+        </p:xfrm>
+        <a:graphic>
+          <a:graphicData uri="http://schemas.openxmlformats.org/drawingml/2006/table">
+            <a:tbl>
+              <a:tblPr firstRow="1" bandRow="1">
+                <a:tableStyleId>{073A0DAA-6AF3-43AB-8588-CEC1D06C72B9}</a:tableStyleId>
+              </a:tblPr>
+              <a:tblGrid>
+                <a:gridCol w="756560">
+                  <a:extLst>
+                    <a:ext uri="{9D8B030D-6E8A-4147-A177-3AD203B41FA5}">
+                      <a16:colId xmlns:a16="http://schemas.microsoft.com/office/drawing/2014/main" xmlns="" val="20000"/>
+                    </a:ext>
+                  </a:extLst>
+                </a:gridCol>
+                <a:gridCol w="1584176">
+                  <a:extLst>
+                    <a:ext uri="{9D8B030D-6E8A-4147-A177-3AD203B41FA5}">
+                      <a16:colId xmlns:a16="http://schemas.microsoft.com/office/drawing/2014/main" xmlns="" val="20001"/>
+                    </a:ext>
+                  </a:extLst>
+                </a:gridCol>
+                <a:gridCol w="1584479">
+                  <a:extLst>
+                    <a:ext uri="{9D8B030D-6E8A-4147-A177-3AD203B41FA5}">
+                      <a16:colId xmlns:a16="http://schemas.microsoft.com/office/drawing/2014/main" xmlns="" val="20002"/>
+                    </a:ext>
+                  </a:extLst>
+                </a:gridCol>
+              </a:tblGrid>
+              <a:tr h="552450">
+                <a:tc>
+                  <a:txBody>
+                    <a:bodyPr/>
+                    <a:lstStyle/>
+                    <a:p>
+                      <a:endParaRPr lang="en-US" dirty="0">
+                        <a:solidFill>
+                          <a:schemeClr val="bg1"/>
+                        </a:solidFill>
+                      </a:endParaRPr>
+                    </a:p>
+                  </a:txBody>
+                  <a:tcPr anchor="ctr">
+                    <a:solidFill>
+                      <a:schemeClr val="tx2">
+                        <a:lumMod val="50000"/>
+                        <a:lumOff val="50000"/>
+                      </a:schemeClr>
+                    </a:solidFill>
+                  </a:tcPr>
+                </a:tc>
+                <a:tc>
+                  <a:txBody>
+                    <a:bodyPr/>
+                    <a:lstStyle/>
+                    <a:p>
+                      <a:pPr algn="ctr"/>
+                      <a:r>
+                        <a:rPr lang="en-US" dirty="0" smtClean="0"/>
+                        <a:t>Specialized </a:t>
+                      </a:r>
+                      <a:r>
+                        <a:rPr lang="en-US" dirty="0" smtClean="0"/>
+                        <a:t>method</a:t>
+                      </a:r>
+                      <a:endParaRPr lang="en-US" dirty="0"/>
+                    </a:p>
+                  </a:txBody>
+                  <a:tcPr anchor="ctr"/>
+                </a:tc>
+                <a:tc>
+                  <a:txBody>
+                    <a:bodyPr/>
+                    <a:lstStyle/>
+                    <a:p>
+                      <a:pPr algn="ctr"/>
+                      <a:r>
+                        <a:rPr lang="en-US" dirty="0" err="1" smtClean="0"/>
+                        <a:t>Schur-Parlett</a:t>
+                      </a:r>
+                      <a:endParaRPr lang="en-US" dirty="0"/>
+                    </a:p>
+                  </a:txBody>
+                  <a:tcPr anchor="ctr"/>
+                </a:tc>
+                <a:extLst>
+                  <a:ext uri="{0D108BD9-81ED-4DB2-BD59-A6C34878D82A}">
+                    <a16:rowId xmlns:a16="http://schemas.microsoft.com/office/drawing/2014/main" xmlns="" val="10000"/>
+                  </a:ext>
+                </a:extLst>
+              </a:tr>
+              <a:tr h="552450">
+                <a:tc>
+                  <a:txBody>
+                    <a:bodyPr/>
+                    <a:lstStyle/>
+                    <a:p>
+                      <a:r>
+                        <a:rPr lang="en-US" dirty="0" err="1" smtClean="0"/>
+                        <a:t>exp</a:t>
+                      </a:r>
+                      <a:endParaRPr lang="en-US" dirty="0"/>
+                    </a:p>
+                  </a:txBody>
+                  <a:tcPr anchor="ctr"/>
+                </a:tc>
+                <a:tc>
+                  <a:txBody>
+                    <a:bodyPr/>
+                    <a:lstStyle/>
+                    <a:p>
+                      <a:pPr marL="0" marR="0" lvl="0" indent="0" algn="ctr" defTabSz="914400" rtl="0" eaLnBrk="1" fontAlgn="auto" latinLnBrk="0" hangingPunct="1">
+                        <a:lnSpc>
+                          <a:spcPct val="100000"/>
+                        </a:lnSpc>
+                        <a:spcBef>
+                          <a:spcPts val="0"/>
+                        </a:spcBef>
+                        <a:spcAft>
+                          <a:spcPts val="0"/>
+                        </a:spcAft>
+                        <a:buClrTx/>
+                        <a:buSzTx/>
+                        <a:buFontTx/>
+                        <a:buNone/>
+                        <a:tabLst/>
+                        <a:defRPr/>
+                      </a:pPr>
+                      <a:r>
+                        <a:rPr lang="en-US" dirty="0" smtClean="0">
+                          <a:latin typeface="Cambria Math" panose="02040503050406030204" pitchFamily="18" charset="0"/>
+                          <a:ea typeface="Cambria Math" panose="02040503050406030204" pitchFamily="18" charset="0"/>
+                        </a:rPr>
+                        <a:t>1.0e-14</a:t>
+                      </a:r>
+                    </a:p>
+                  </a:txBody>
+                  <a:tcPr anchor="ctr"/>
+                </a:tc>
+                <a:tc>
+                  <a:txBody>
+                    <a:bodyPr/>
+                    <a:lstStyle/>
+                    <a:p>
+                      <a:pPr algn="ctr"/>
+                      <a:r>
+                        <a:rPr lang="en-US" dirty="0" smtClean="0">
+                          <a:latin typeface="Cambria Math" panose="02040503050406030204" pitchFamily="18" charset="0"/>
+                          <a:ea typeface="Cambria Math" panose="02040503050406030204" pitchFamily="18" charset="0"/>
+                        </a:rPr>
+                        <a:t>1.5e-13</a:t>
+                      </a:r>
+                      <a:endParaRPr lang="en-US" dirty="0">
+                        <a:latin typeface="Cambria Math" panose="02040503050406030204" pitchFamily="18" charset="0"/>
+                        <a:ea typeface="Cambria Math" panose="02040503050406030204" pitchFamily="18" charset="0"/>
+                      </a:endParaRPr>
+                    </a:p>
+                  </a:txBody>
+                  <a:tcPr anchor="ctr"/>
+                </a:tc>
+                <a:extLst>
+                  <a:ext uri="{0D108BD9-81ED-4DB2-BD59-A6C34878D82A}">
+                    <a16:rowId xmlns:a16="http://schemas.microsoft.com/office/drawing/2014/main" xmlns="" val="10001"/>
+                  </a:ext>
+                </a:extLst>
+              </a:tr>
+              <a:tr h="552450">
+                <a:tc>
+                  <a:txBody>
+                    <a:bodyPr/>
+                    <a:lstStyle/>
+                    <a:p>
+                      <a:r>
+                        <a:rPr lang="en-US" dirty="0" smtClean="0"/>
+                        <a:t>log</a:t>
+                      </a:r>
+                      <a:endParaRPr lang="en-US" dirty="0"/>
+                    </a:p>
+                  </a:txBody>
+                  <a:tcPr anchor="ctr"/>
+                </a:tc>
+                <a:tc>
+                  <a:txBody>
+                    <a:bodyPr/>
+                    <a:lstStyle/>
+                    <a:p>
+                      <a:pPr marL="0" marR="0" lvl="0" indent="0" algn="ctr" defTabSz="914400" rtl="0" eaLnBrk="1" fontAlgn="auto" latinLnBrk="0" hangingPunct="1">
+                        <a:lnSpc>
+                          <a:spcPct val="100000"/>
+                        </a:lnSpc>
+                        <a:spcBef>
+                          <a:spcPts val="0"/>
+                        </a:spcBef>
+                        <a:spcAft>
+                          <a:spcPts val="0"/>
+                        </a:spcAft>
+                        <a:buClrTx/>
+                        <a:buSzTx/>
+                        <a:buFontTx/>
+                        <a:buNone/>
+                        <a:tabLst/>
+                        <a:defRPr/>
+                      </a:pPr>
+                      <a:r>
+                        <a:rPr lang="en-US" dirty="0" smtClean="0">
+                          <a:latin typeface="Cambria Math" panose="02040503050406030204" pitchFamily="18" charset="0"/>
+                          <a:ea typeface="Cambria Math" panose="02040503050406030204" pitchFamily="18" charset="0"/>
+                        </a:rPr>
+                        <a:t>4.0e-14</a:t>
+                      </a:r>
+                    </a:p>
+                  </a:txBody>
+                  <a:tcPr anchor="ctr"/>
+                </a:tc>
+                <a:tc>
+                  <a:txBody>
+                    <a:bodyPr/>
+                    <a:lstStyle/>
+                    <a:p>
+                      <a:pPr algn="ctr"/>
+                      <a:r>
+                        <a:rPr lang="en-US" dirty="0" smtClean="0">
+                          <a:latin typeface="Cambria Math" panose="02040503050406030204" pitchFamily="18" charset="0"/>
+                          <a:ea typeface="Cambria Math" panose="02040503050406030204" pitchFamily="18" charset="0"/>
+                        </a:rPr>
+                        <a:t>4.1e-14</a:t>
+                      </a:r>
+                      <a:endParaRPr lang="en-US" dirty="0">
+                        <a:latin typeface="Cambria Math" panose="02040503050406030204" pitchFamily="18" charset="0"/>
+                        <a:ea typeface="Cambria Math" panose="02040503050406030204" pitchFamily="18" charset="0"/>
+                      </a:endParaRPr>
+                    </a:p>
+                  </a:txBody>
+                  <a:tcPr anchor="ctr"/>
+                </a:tc>
+                <a:extLst>
+                  <a:ext uri="{0D108BD9-81ED-4DB2-BD59-A6C34878D82A}">
+                    <a16:rowId xmlns:a16="http://schemas.microsoft.com/office/drawing/2014/main" xmlns="" val="10002"/>
+                  </a:ext>
+                </a:extLst>
+              </a:tr>
+              <a:tr h="552450">
+                <a:tc>
+                  <a:txBody>
+                    <a:bodyPr/>
+                    <a:lstStyle/>
+                    <a:p>
+                      <a:r>
+                        <a:rPr lang="en-US" dirty="0" err="1" smtClean="0"/>
+                        <a:t>sqrt</a:t>
+                      </a:r>
+                      <a:endParaRPr lang="en-US" dirty="0" smtClean="0"/>
+                    </a:p>
+                  </a:txBody>
+                  <a:tcPr anchor="ctr"/>
+                </a:tc>
+                <a:tc>
+                  <a:txBody>
+                    <a:bodyPr/>
+                    <a:lstStyle/>
+                    <a:p>
+                      <a:pPr marL="0" marR="0" lvl="0" indent="0" algn="ctr" defTabSz="914400" rtl="0" eaLnBrk="1" fontAlgn="auto" latinLnBrk="0" hangingPunct="1">
+                        <a:lnSpc>
+                          <a:spcPct val="100000"/>
+                        </a:lnSpc>
+                        <a:spcBef>
+                          <a:spcPts val="0"/>
+                        </a:spcBef>
+                        <a:spcAft>
+                          <a:spcPts val="0"/>
+                        </a:spcAft>
+                        <a:buClrTx/>
+                        <a:buSzTx/>
+                        <a:buFontTx/>
+                        <a:buNone/>
+                        <a:tabLst/>
+                        <a:defRPr/>
+                      </a:pPr>
+                      <a:r>
+                        <a:rPr lang="en-US" dirty="0" smtClean="0">
+                          <a:latin typeface="Cambria Math" panose="02040503050406030204" pitchFamily="18" charset="0"/>
+                          <a:ea typeface="Cambria Math" panose="02040503050406030204" pitchFamily="18" charset="0"/>
+                        </a:rPr>
+                        <a:t>4.3e-14</a:t>
+                      </a:r>
+                    </a:p>
+                  </a:txBody>
+                  <a:tcPr anchor="ctr"/>
+                </a:tc>
+                <a:tc>
+                  <a:txBody>
+                    <a:bodyPr/>
+                    <a:lstStyle/>
+                    <a:p>
+                      <a:pPr algn="ctr"/>
+                      <a:r>
+                        <a:rPr lang="en-US" dirty="0" smtClean="0">
+                          <a:latin typeface="Cambria Math" panose="02040503050406030204" pitchFamily="18" charset="0"/>
+                          <a:ea typeface="Cambria Math" panose="02040503050406030204" pitchFamily="18" charset="0"/>
+                        </a:rPr>
+                        <a:t>4.5e-14</a:t>
+                      </a:r>
+                      <a:endParaRPr lang="en-US" dirty="0">
+                        <a:latin typeface="Cambria Math" panose="02040503050406030204" pitchFamily="18" charset="0"/>
+                        <a:ea typeface="Cambria Math" panose="02040503050406030204" pitchFamily="18" charset="0"/>
+                      </a:endParaRPr>
+                    </a:p>
+                  </a:txBody>
+                  <a:tcPr anchor="ctr"/>
+                </a:tc>
+                <a:extLst>
+                  <a:ext uri="{0D108BD9-81ED-4DB2-BD59-A6C34878D82A}">
+                    <a16:rowId xmlns:a16="http://schemas.microsoft.com/office/drawing/2014/main" xmlns="" val="10003"/>
+                  </a:ext>
+                </a:extLst>
+              </a:tr>
+            </a:tbl>
+          </a:graphicData>
+        </a:graphic>
+      </p:graphicFrame>
+      <p:sp>
+        <p:nvSpPr>
+          <p:cNvPr id="8" name="Content Placeholder 6"/>
+          <p:cNvSpPr>
+            <a:spLocks noGrp="1"/>
+          </p:cNvSpPr>
+          <p:nvPr>
+            <p:ph sz="half" idx="2"/>
+          </p:nvPr>
+        </p:nvSpPr>
+        <p:spPr>
+          <a:xfrm>
+            <a:off x="7606580" y="1606062"/>
+            <a:ext cx="3913370" cy="1224136"/>
+          </a:xfrm>
+        </p:spPr>
+        <p:txBody>
+          <a:bodyPr>
+            <a:normAutofit/>
+          </a:bodyPr>
+          <a:lstStyle/>
+          <a:p>
+            <a:pPr marL="0" indent="0">
+              <a:buNone/>
+            </a:pPr>
+            <a:r>
+              <a:rPr lang="en-US" sz="2200" dirty="0" smtClean="0"/>
+              <a:t>Relative error</a:t>
+            </a:r>
+            <a:r>
+              <a:rPr lang="en-US" sz="2200" dirty="0" smtClean="0"/>
+              <a:t> versus </a:t>
+            </a:r>
+            <a:r>
+              <a:rPr lang="en-US" sz="2200" dirty="0" err="1" smtClean="0"/>
+              <a:t>MatLab’s</a:t>
+            </a:r>
+            <a:r>
+              <a:rPr lang="en-US" sz="2200" dirty="0" smtClean="0"/>
+              <a:t> Symbolic Toolbox</a:t>
+            </a:r>
+            <a:r>
+              <a:rPr lang="en-US" sz="2200" dirty="0" smtClean="0"/>
+              <a:t> (on 50x50 random matrix):</a:t>
+            </a:r>
+            <a:endParaRPr lang="en-US" sz="2200" dirty="0" smtClean="0"/>
+          </a:p>
+        </p:txBody>
+      </p:sp>
+      <p:pic>
+        <p:nvPicPr>
+          <p:cNvPr id="4" name="Picture 3"/>
+          <p:cNvPicPr>
+            <a:picLocks noChangeAspect="1"/>
+          </p:cNvPicPr>
+          <p:nvPr/>
+        </p:nvPicPr>
+        <p:blipFill>
+          <a:blip r:embed="rId2">
+            <a:extLst>
+              <a:ext uri="{28A0092B-C50C-407E-A947-70E740481C1C}">
+                <a14:useLocalDpi xmlns:a14="http://schemas.microsoft.com/office/drawing/2010/main" val="0"/>
+              </a:ext>
+            </a:extLst>
+          </a:blip>
+          <a:stretch>
+            <a:fillRect/>
+          </a:stretch>
+        </p:blipFill>
+        <p:spPr>
+          <a:xfrm>
+            <a:off x="1593436" y="2221601"/>
+            <a:ext cx="4536218" cy="3172731"/>
+          </a:xfrm>
+          <a:prstGeom prst="rect">
+            <a:avLst/>
+          </a:prstGeom>
+        </p:spPr>
+      </p:pic>
+      <p:sp>
+        <p:nvSpPr>
+          <p:cNvPr id="10" name="Content Placeholder 6"/>
+          <p:cNvSpPr txBox="1">
+            <a:spLocks/>
+          </p:cNvSpPr>
+          <p:nvPr/>
+        </p:nvSpPr>
+        <p:spPr>
+          <a:xfrm>
+            <a:off x="1593149" y="1268760"/>
+            <a:ext cx="4752814" cy="1224136"/>
+          </a:xfrm>
+          <a:prstGeom prst="rect">
+            <a:avLst/>
+          </a:prstGeom>
+        </p:spPr>
+        <p:txBody>
+          <a:bodyPr vert="horz" lIns="91440" tIns="45720" rIns="91440" bIns="45720" rtlCol="0">
+            <a:normAutofit/>
+          </a:bodyPr>
+          <a:lstStyle>
+            <a:lvl1pPr marL="246888" indent="-246888" algn="l" defTabSz="914400" rtl="0" eaLnBrk="1" latinLnBrk="0" hangingPunct="1">
+              <a:lnSpc>
+                <a:spcPct val="90000"/>
+              </a:lnSpc>
+              <a:spcBef>
+                <a:spcPts val="1400"/>
+              </a:spcBef>
+              <a:buFont typeface="Euphemia" pitchFamily="34" charset="0"/>
+              <a:buChar char="›"/>
+              <a:defRPr sz="2800" kern="1200">
+                <a:solidFill>
+                  <a:schemeClr val="tx1"/>
+                </a:solidFill>
+                <a:latin typeface="+mn-lt"/>
+                <a:ea typeface="+mn-ea"/>
+                <a:cs typeface="+mn-cs"/>
+              </a:defRPr>
+            </a:lvl1pPr>
+            <a:lvl2pPr marL="612648" indent="-246888" algn="l" defTabSz="914400" rtl="0" eaLnBrk="1" latinLnBrk="0" hangingPunct="1">
+              <a:lnSpc>
+                <a:spcPct val="90000"/>
+              </a:lnSpc>
+              <a:spcBef>
+                <a:spcPts val="600"/>
+              </a:spcBef>
+              <a:buFont typeface="Euphemia" pitchFamily="34" charset="0"/>
+              <a:buChar char="–"/>
+              <a:defRPr sz="2400" kern="1200">
+                <a:solidFill>
+                  <a:schemeClr val="tx1"/>
+                </a:solidFill>
+                <a:latin typeface="+mn-lt"/>
+                <a:ea typeface="+mn-ea"/>
+                <a:cs typeface="+mn-cs"/>
+              </a:defRPr>
+            </a:lvl2pPr>
+            <a:lvl3pPr marL="978408" indent="-246888" algn="l" defTabSz="914400" rtl="0" eaLnBrk="1" latinLnBrk="0" hangingPunct="1">
+              <a:lnSpc>
+                <a:spcPct val="90000"/>
+              </a:lnSpc>
+              <a:spcBef>
+                <a:spcPts val="600"/>
+              </a:spcBef>
+              <a:buFont typeface="Euphemia" pitchFamily="34" charset="0"/>
+              <a:buChar char="›"/>
+              <a:defRPr sz="2000" kern="1200">
+                <a:solidFill>
+                  <a:schemeClr val="tx1"/>
+                </a:solidFill>
+                <a:latin typeface="+mn-lt"/>
+                <a:ea typeface="+mn-ea"/>
+                <a:cs typeface="+mn-cs"/>
+              </a:defRPr>
+            </a:lvl3pPr>
+            <a:lvl4pPr marL="1344168" indent="-246888" algn="l" defTabSz="914400" rtl="0" eaLnBrk="1" latinLnBrk="0" hangingPunct="1">
+              <a:lnSpc>
+                <a:spcPct val="90000"/>
+              </a:lnSpc>
+              <a:spcBef>
+                <a:spcPts val="600"/>
+              </a:spcBef>
+              <a:buFont typeface="Arial" pitchFamily="34" charset="0"/>
+              <a:buChar char="–"/>
+              <a:defRPr sz="1800" kern="1200">
+                <a:solidFill>
+                  <a:schemeClr val="tx1"/>
+                </a:solidFill>
+                <a:latin typeface="+mn-lt"/>
+                <a:ea typeface="+mn-ea"/>
+                <a:cs typeface="+mn-cs"/>
+              </a:defRPr>
+            </a:lvl4pPr>
+            <a:lvl5pPr marL="1709928" indent="-246888" algn="l" defTabSz="914400" rtl="0" eaLnBrk="1" latinLnBrk="0" hangingPunct="1">
+              <a:lnSpc>
+                <a:spcPct val="90000"/>
+              </a:lnSpc>
+              <a:spcBef>
+                <a:spcPts val="600"/>
+              </a:spcBef>
+              <a:buFont typeface="Euphemia" pitchFamily="34" charset="0"/>
+              <a:buChar char="›"/>
+              <a:defRPr sz="1800" kern="1200">
+                <a:solidFill>
+                  <a:schemeClr val="tx1"/>
+                </a:solidFill>
+                <a:latin typeface="+mn-lt"/>
+                <a:ea typeface="+mn-ea"/>
+                <a:cs typeface="+mn-cs"/>
+              </a:defRPr>
+            </a:lvl5pPr>
+            <a:lvl6pPr marL="2075688" indent="-246888" algn="l" defTabSz="914400" rtl="0" eaLnBrk="1" latinLnBrk="0" hangingPunct="1">
+              <a:lnSpc>
+                <a:spcPct val="90000"/>
+              </a:lnSpc>
+              <a:spcBef>
+                <a:spcPts val="600"/>
+              </a:spcBef>
+              <a:buFont typeface="Euphemia" pitchFamily="34" charset="0"/>
+              <a:buChar char="–"/>
+              <a:defRPr sz="1800" kern="1200" baseline="0">
+                <a:solidFill>
+                  <a:schemeClr val="tx1"/>
+                </a:solidFill>
+                <a:latin typeface="+mn-lt"/>
+                <a:ea typeface="+mn-ea"/>
+                <a:cs typeface="+mn-cs"/>
+              </a:defRPr>
+            </a:lvl6pPr>
+            <a:lvl7pPr marL="2441448" indent="-246888" algn="l" defTabSz="914400" rtl="0" eaLnBrk="1" latinLnBrk="0" hangingPunct="1">
+              <a:lnSpc>
+                <a:spcPct val="90000"/>
+              </a:lnSpc>
+              <a:spcBef>
+                <a:spcPts val="600"/>
+              </a:spcBef>
+              <a:buFont typeface="Euphemia" pitchFamily="34" charset="0"/>
+              <a:buChar char="›"/>
+              <a:defRPr sz="1800" kern="1200" baseline="0">
+                <a:solidFill>
+                  <a:schemeClr val="tx1"/>
+                </a:solidFill>
+                <a:latin typeface="+mn-lt"/>
+                <a:ea typeface="+mn-ea"/>
+                <a:cs typeface="+mn-cs"/>
+              </a:defRPr>
+            </a:lvl7pPr>
+            <a:lvl8pPr marL="2807208" indent="-246888" algn="l" defTabSz="914400" rtl="0" eaLnBrk="1" latinLnBrk="0" hangingPunct="1">
+              <a:lnSpc>
+                <a:spcPct val="90000"/>
+              </a:lnSpc>
+              <a:spcBef>
+                <a:spcPts val="600"/>
+              </a:spcBef>
+              <a:buFont typeface="Euphemia" pitchFamily="34" charset="0"/>
+              <a:buChar char="–"/>
+              <a:defRPr sz="1800" kern="1200" baseline="0">
+                <a:solidFill>
+                  <a:schemeClr val="tx1"/>
+                </a:solidFill>
+                <a:latin typeface="+mn-lt"/>
+                <a:ea typeface="+mn-ea"/>
+                <a:cs typeface="+mn-cs"/>
+              </a:defRPr>
+            </a:lvl8pPr>
+            <a:lvl9pPr marL="3172968" indent="-246888" algn="l" defTabSz="914400" rtl="0" eaLnBrk="1" latinLnBrk="0" hangingPunct="1">
+              <a:lnSpc>
+                <a:spcPct val="90000"/>
+              </a:lnSpc>
+              <a:spcBef>
+                <a:spcPts val="600"/>
+              </a:spcBef>
+              <a:buFont typeface="Euphemia" pitchFamily="34" charset="0"/>
+              <a:buChar char="›"/>
+              <a:defRPr sz="1800" kern="1200" baseline="0">
+                <a:solidFill>
+                  <a:schemeClr val="tx1"/>
+                </a:solidFill>
+                <a:latin typeface="+mn-lt"/>
+                <a:ea typeface="+mn-ea"/>
+                <a:cs typeface="+mn-cs"/>
+              </a:defRPr>
+            </a:lvl9pPr>
+          </a:lstStyle>
+          <a:p>
+            <a:pPr marL="0" indent="0">
+              <a:buFont typeface="Euphemia" pitchFamily="34" charset="0"/>
+              <a:buNone/>
+            </a:pPr>
+            <a:r>
+              <a:rPr lang="en-US" sz="2400" dirty="0" smtClean="0"/>
+              <a:t>Boils down to how well the eigenvalues can be clustered:</a:t>
+            </a:r>
+            <a:endParaRPr lang="en-US" sz="2400" dirty="0"/>
+          </a:p>
+        </p:txBody>
+      </p:sp>
+      <mc:AlternateContent xmlns:mc="http://schemas.openxmlformats.org/markup-compatibility/2006">
+        <mc:Choice xmlns:a14="http://schemas.microsoft.com/office/drawing/2010/main" Requires="a14">
           <p:sp>
             <p:nvSpPr>
-              <p:cNvPr id="14" name="Content Placeholder 13"/>
-              <p:cNvSpPr>
-                <a:spLocks noGrp="1"/>
-              </p:cNvSpPr>
-              <p:nvPr>
-                <p:ph idx="1"/>
-              </p:nvPr>
+              <p:cNvPr id="12" name="TextBox 11"/>
+              <p:cNvSpPr txBox="1"/>
+              <p:nvPr/>
             </p:nvSpPr>
             <p:spPr>
               <a:xfrm>
-                <a:off x="1593436" y="1600200"/>
-                <a:ext cx="9782801" cy="2476872"/>
+                <a:off x="6454452" y="3320177"/>
+                <a:ext cx="576064" cy="1015663"/>
               </a:xfrm>
+              <a:prstGeom prst="rect">
+                <a:avLst/>
+              </a:prstGeom>
+              <a:noFill/>
             </p:spPr>
             <p:txBody>
-              <a:bodyPr>
-                <a:normAutofit/>
+              <a:bodyPr wrap="square" rtlCol="0">
+                <a:spAutoFit/>
               </a:bodyPr>
               <a:lstStyle/>
               <a:p>
-                <a:pPr marL="0" indent="0">
-                  <a:buNone/>
-                </a:pPr>
-                <a:r>
-                  <a:rPr lang="en-US" dirty="0" smtClean="0"/>
-                  <a:t>Can be good, better than specialized methods (like </a:t>
-                </a:r>
+                <a:pPr/>
                 <a14:m>
-                  <m:oMath xmlns:m="http://schemas.openxmlformats.org/officeDocument/2006/math">
-                    <m:r>
-                      <a:rPr lang="en-US" i="1" dirty="0" smtClean="0">
-                        <a:latin typeface="Cambria Math" panose="02040503050406030204" pitchFamily="18" charset="0"/>
-                      </a:rPr>
-                      <m:t>𝑒𝑥𝑝𝑚</m:t>
-                    </m:r>
-                  </m:oMath>
+                  <m:oMathPara xmlns:m="http://schemas.openxmlformats.org/officeDocument/2006/math">
+                    <m:oMathParaPr>
+                      <m:jc m:val="centerGroup"/>
+                    </m:oMathParaPr>
+                    <m:oMath xmlns:m="http://schemas.openxmlformats.org/officeDocument/2006/math">
+                      <m:r>
+                        <a:rPr lang="it-IT" sz="6000" b="0" i="1" smtClean="0">
+                          <a:latin typeface="Cambria Math" panose="02040503050406030204" pitchFamily="18" charset="0"/>
+                        </a:rPr>
+                        <m:t>⇒</m:t>
+                      </m:r>
+                    </m:oMath>
+                  </m:oMathPara>
                 </a14:m>
-                <a:r>
-                  <a:rPr lang="en-US" dirty="0" smtClean="0"/>
-                  <a:t> on badly scaled matrices);</a:t>
-                </a:r>
-              </a:p>
-              <a:p>
-                <a:pPr marL="0" indent="0">
-                  <a:buNone/>
-                </a:pPr>
-                <a:r>
-                  <a:rPr lang="en-US" dirty="0" smtClean="0"/>
-                  <a:t>Can be bad, when eigenvalues can’t be grouped well:</a:t>
-                </a:r>
+                <a:endParaRPr lang="it-IT" sz="6000" dirty="0"/>
               </a:p>
             </p:txBody>
           </p:sp>
         </mc:Choice>
-        <mc:Fallback xmlns="">
+        <mc:Fallback>
           <p:sp>
             <p:nvSpPr>
-              <p:cNvPr id="14" name="Content Placeholder 13"/>
-              <p:cNvSpPr>
-                <a:spLocks noGrp="1" noRot="1" noChangeAspect="1" noMove="1" noResize="1" noEditPoints="1" noAdjustHandles="1" noChangeArrowheads="1" noChangeShapeType="1" noTextEdit="1"/>
+              <p:cNvPr id="12" name="TextBox 11"/>
+              <p:cNvSpPr txBox="1">
+                <a:spLocks noRot="1" noChangeAspect="1" noMove="1" noResize="1" noEditPoints="1" noAdjustHandles="1" noChangeArrowheads="1" noChangeShapeType="1" noTextEdit="1"/>
               </p:cNvSpPr>
-              <p:nvPr>
-                <p:ph idx="1"/>
-              </p:nvPr>
+              <p:nvPr/>
             </p:nvSpPr>
             <p:spPr>
               <a:xfrm>
-                <a:off x="1593436" y="1600200"/>
-                <a:ext cx="9782801" cy="2476872"/>
+                <a:off x="6454452" y="3320177"/>
+                <a:ext cx="576064" cy="1015663"/>
               </a:xfrm>
+              <a:prstGeom prst="rect">
+                <a:avLst/>
+              </a:prstGeom>
               <a:blipFill rotWithShape="0">
-                <a:blip r:embed="rId2"/>
+                <a:blip r:embed="rId3"/>
                 <a:stretch>
-                  <a:fillRect l="-1246" t="-4680"/>
+                  <a:fillRect r="-23404"/>
                 </a:stretch>
               </a:blipFill>
             </p:spPr>
@@ -15084,40 +15328,223 @@
           </p:sp>
         </mc:Fallback>
       </mc:AlternateContent>
-      <p:pic>
-        <p:nvPicPr>
-          <p:cNvPr id="4" name="Picture 3"/>
-          <p:cNvPicPr>
-            <a:picLocks noChangeAspect="1"/>
-          </p:cNvPicPr>
+      <p:sp>
+        <p:nvSpPr>
+          <p:cNvPr id="13" name="Content Placeholder 6"/>
+          <p:cNvSpPr txBox="1">
+            <a:spLocks/>
+          </p:cNvSpPr>
           <p:nvPr/>
-        </p:nvPicPr>
-        <p:blipFill>
-          <a:blip r:embed="rId3">
-            <a:extLst>
-              <a:ext uri="{28A0092B-C50C-407E-A947-70E740481C1C}">
-                <a14:useLocalDpi xmlns:a14="http://schemas.microsoft.com/office/drawing/2010/main" val="0"/>
-              </a:ext>
-            </a:extLst>
-          </a:blip>
-          <a:stretch>
-            <a:fillRect/>
-          </a:stretch>
-        </p:blipFill>
+        </p:nvSpPr>
         <p:spPr>
           <a:xfrm>
-            <a:off x="2566020" y="3861048"/>
-            <a:ext cx="6630058" cy="2044824"/>
+            <a:off x="1593149" y="5877272"/>
+            <a:ext cx="6513452" cy="1224136"/>
           </a:xfrm>
           <a:prstGeom prst="rect">
             <a:avLst/>
           </a:prstGeom>
         </p:spPr>
-      </p:pic>
+        <p:txBody>
+          <a:bodyPr vert="horz" lIns="91440" tIns="45720" rIns="91440" bIns="45720" rtlCol="0">
+            <a:normAutofit/>
+          </a:bodyPr>
+          <a:lstStyle>
+            <a:lvl1pPr marL="246888" indent="-246888" algn="l" defTabSz="914400" rtl="0" eaLnBrk="1" latinLnBrk="0" hangingPunct="1">
+              <a:lnSpc>
+                <a:spcPct val="90000"/>
+              </a:lnSpc>
+              <a:spcBef>
+                <a:spcPts val="1400"/>
+              </a:spcBef>
+              <a:buFont typeface="Euphemia" pitchFamily="34" charset="0"/>
+              <a:buChar char="›"/>
+              <a:defRPr sz="2800" kern="1200">
+                <a:solidFill>
+                  <a:schemeClr val="tx1"/>
+                </a:solidFill>
+                <a:latin typeface="+mn-lt"/>
+                <a:ea typeface="+mn-ea"/>
+                <a:cs typeface="+mn-cs"/>
+              </a:defRPr>
+            </a:lvl1pPr>
+            <a:lvl2pPr marL="612648" indent="-246888" algn="l" defTabSz="914400" rtl="0" eaLnBrk="1" latinLnBrk="0" hangingPunct="1">
+              <a:lnSpc>
+                <a:spcPct val="90000"/>
+              </a:lnSpc>
+              <a:spcBef>
+                <a:spcPts val="600"/>
+              </a:spcBef>
+              <a:buFont typeface="Euphemia" pitchFamily="34" charset="0"/>
+              <a:buChar char="–"/>
+              <a:defRPr sz="2400" kern="1200">
+                <a:solidFill>
+                  <a:schemeClr val="tx1"/>
+                </a:solidFill>
+                <a:latin typeface="+mn-lt"/>
+                <a:ea typeface="+mn-ea"/>
+                <a:cs typeface="+mn-cs"/>
+              </a:defRPr>
+            </a:lvl2pPr>
+            <a:lvl3pPr marL="978408" indent="-246888" algn="l" defTabSz="914400" rtl="0" eaLnBrk="1" latinLnBrk="0" hangingPunct="1">
+              <a:lnSpc>
+                <a:spcPct val="90000"/>
+              </a:lnSpc>
+              <a:spcBef>
+                <a:spcPts val="600"/>
+              </a:spcBef>
+              <a:buFont typeface="Euphemia" pitchFamily="34" charset="0"/>
+              <a:buChar char="›"/>
+              <a:defRPr sz="2000" kern="1200">
+                <a:solidFill>
+                  <a:schemeClr val="tx1"/>
+                </a:solidFill>
+                <a:latin typeface="+mn-lt"/>
+                <a:ea typeface="+mn-ea"/>
+                <a:cs typeface="+mn-cs"/>
+              </a:defRPr>
+            </a:lvl3pPr>
+            <a:lvl4pPr marL="1344168" indent="-246888" algn="l" defTabSz="914400" rtl="0" eaLnBrk="1" latinLnBrk="0" hangingPunct="1">
+              <a:lnSpc>
+                <a:spcPct val="90000"/>
+              </a:lnSpc>
+              <a:spcBef>
+                <a:spcPts val="600"/>
+              </a:spcBef>
+              <a:buFont typeface="Arial" pitchFamily="34" charset="0"/>
+              <a:buChar char="–"/>
+              <a:defRPr sz="1800" kern="1200">
+                <a:solidFill>
+                  <a:schemeClr val="tx1"/>
+                </a:solidFill>
+                <a:latin typeface="+mn-lt"/>
+                <a:ea typeface="+mn-ea"/>
+                <a:cs typeface="+mn-cs"/>
+              </a:defRPr>
+            </a:lvl4pPr>
+            <a:lvl5pPr marL="1709928" indent="-246888" algn="l" defTabSz="914400" rtl="0" eaLnBrk="1" latinLnBrk="0" hangingPunct="1">
+              <a:lnSpc>
+                <a:spcPct val="90000"/>
+              </a:lnSpc>
+              <a:spcBef>
+                <a:spcPts val="600"/>
+              </a:spcBef>
+              <a:buFont typeface="Euphemia" pitchFamily="34" charset="0"/>
+              <a:buChar char="›"/>
+              <a:defRPr sz="1800" kern="1200">
+                <a:solidFill>
+                  <a:schemeClr val="tx1"/>
+                </a:solidFill>
+                <a:latin typeface="+mn-lt"/>
+                <a:ea typeface="+mn-ea"/>
+                <a:cs typeface="+mn-cs"/>
+              </a:defRPr>
+            </a:lvl5pPr>
+            <a:lvl6pPr marL="2075688" indent="-246888" algn="l" defTabSz="914400" rtl="0" eaLnBrk="1" latinLnBrk="0" hangingPunct="1">
+              <a:lnSpc>
+                <a:spcPct val="90000"/>
+              </a:lnSpc>
+              <a:spcBef>
+                <a:spcPts val="600"/>
+              </a:spcBef>
+              <a:buFont typeface="Euphemia" pitchFamily="34" charset="0"/>
+              <a:buChar char="–"/>
+              <a:defRPr sz="1800" kern="1200" baseline="0">
+                <a:solidFill>
+                  <a:schemeClr val="tx1"/>
+                </a:solidFill>
+                <a:latin typeface="+mn-lt"/>
+                <a:ea typeface="+mn-ea"/>
+                <a:cs typeface="+mn-cs"/>
+              </a:defRPr>
+            </a:lvl6pPr>
+            <a:lvl7pPr marL="2441448" indent="-246888" algn="l" defTabSz="914400" rtl="0" eaLnBrk="1" latinLnBrk="0" hangingPunct="1">
+              <a:lnSpc>
+                <a:spcPct val="90000"/>
+              </a:lnSpc>
+              <a:spcBef>
+                <a:spcPts val="600"/>
+              </a:spcBef>
+              <a:buFont typeface="Euphemia" pitchFamily="34" charset="0"/>
+              <a:buChar char="›"/>
+              <a:defRPr sz="1800" kern="1200" baseline="0">
+                <a:solidFill>
+                  <a:schemeClr val="tx1"/>
+                </a:solidFill>
+                <a:latin typeface="+mn-lt"/>
+                <a:ea typeface="+mn-ea"/>
+                <a:cs typeface="+mn-cs"/>
+              </a:defRPr>
+            </a:lvl7pPr>
+            <a:lvl8pPr marL="2807208" indent="-246888" algn="l" defTabSz="914400" rtl="0" eaLnBrk="1" latinLnBrk="0" hangingPunct="1">
+              <a:lnSpc>
+                <a:spcPct val="90000"/>
+              </a:lnSpc>
+              <a:spcBef>
+                <a:spcPts val="600"/>
+              </a:spcBef>
+              <a:buFont typeface="Euphemia" pitchFamily="34" charset="0"/>
+              <a:buChar char="–"/>
+              <a:defRPr sz="1800" kern="1200" baseline="0">
+                <a:solidFill>
+                  <a:schemeClr val="tx1"/>
+                </a:solidFill>
+                <a:latin typeface="+mn-lt"/>
+                <a:ea typeface="+mn-ea"/>
+                <a:cs typeface="+mn-cs"/>
+              </a:defRPr>
+            </a:lvl8pPr>
+            <a:lvl9pPr marL="3172968" indent="-246888" algn="l" defTabSz="914400" rtl="0" eaLnBrk="1" latinLnBrk="0" hangingPunct="1">
+              <a:lnSpc>
+                <a:spcPct val="90000"/>
+              </a:lnSpc>
+              <a:spcBef>
+                <a:spcPts val="600"/>
+              </a:spcBef>
+              <a:buFont typeface="Euphemia" pitchFamily="34" charset="0"/>
+              <a:buChar char="›"/>
+              <a:defRPr sz="1800" kern="1200" baseline="0">
+                <a:solidFill>
+                  <a:schemeClr val="tx1"/>
+                </a:solidFill>
+                <a:latin typeface="+mn-lt"/>
+                <a:ea typeface="+mn-ea"/>
+                <a:cs typeface="+mn-cs"/>
+              </a:defRPr>
+            </a:lvl9pPr>
+          </a:lstStyle>
+          <a:p>
+            <a:pPr marL="0" indent="0">
+              <a:buFont typeface="Euphemia" pitchFamily="34" charset="0"/>
+              <a:buNone/>
+            </a:pPr>
+            <a:r>
+              <a:rPr lang="en-US" sz="2200" dirty="0"/>
+              <a:t>C</a:t>
+            </a:r>
+            <a:r>
+              <a:rPr lang="en-US" sz="2200" dirty="0" smtClean="0"/>
+              <a:t>an behave badly (</a:t>
+            </a:r>
+            <a:r>
+              <a:rPr lang="en-US" sz="2200" dirty="0" smtClean="0">
+                <a:latin typeface="Cambria Math" panose="02040503050406030204" pitchFamily="18" charset="0"/>
+                <a:ea typeface="Cambria Math" panose="02040503050406030204" pitchFamily="18" charset="0"/>
+              </a:rPr>
+              <a:t>7e-4</a:t>
+            </a:r>
+            <a:r>
+              <a:rPr lang="en-US" sz="2200" dirty="0" smtClean="0"/>
+              <a:t>) with “snake” eigenvalues (as shown in original paper, experiment 4)</a:t>
+            </a:r>
+            <a:endParaRPr lang="en-US" sz="2200" dirty="0"/>
+          </a:p>
+        </p:txBody>
+      </p:sp>
     </p:spTree>
     <p:extLst>
       <p:ext uri="{BB962C8B-B14F-4D97-AF65-F5344CB8AC3E}">
-        <p14:creationId xmlns:p14="http://schemas.microsoft.com/office/powerpoint/2010/main" val="3995048451"/>
+        <p14:creationId xmlns:p14="http://schemas.microsoft.com/office/powerpoint/2010/main" val="2593339164"/>
       </p:ext>
     </p:extLst>
   </p:cSld>
@@ -16324,11 +16751,7 @@
             </a:r>
             <a:r>
               <a:rPr lang="en-US" sz="2600" dirty="0" smtClean="0"/>
-              <a:t> </a:t>
-            </a:r>
-            <a:r>
-              <a:rPr lang="en-US" sz="2600" dirty="0" smtClean="0"/>
-              <a:t>speedup for n = 2500</a:t>
+              <a:t> speedup for n = 2500</a:t>
             </a:r>
           </a:p>
         </p:txBody>
@@ -16507,8 +16930,8 @@
           <a:chExt cx="0" cy="0"/>
         </a:xfrm>
       </p:grpSpPr>
-      <mc:AlternateContent xmlns:mc="http://schemas.openxmlformats.org/markup-compatibility/2006">
-        <mc:Choice xmlns:a14="http://schemas.microsoft.com/office/drawing/2010/main" Requires="a14">
+      <mc:AlternateContent xmlns:mc="http://schemas.openxmlformats.org/markup-compatibility/2006" xmlns:a14="http://schemas.microsoft.com/office/drawing/2010/main">
+        <mc:Choice Requires="a14">
           <p:sp>
             <p:nvSpPr>
               <p:cNvPr id="14" name="Content Placeholder 13"/>
@@ -16606,7 +17029,7 @@
             </p:txBody>
           </p:sp>
         </mc:Choice>
-        <mc:Fallback>
+        <mc:Fallback xmlns="">
           <p:sp>
             <p:nvSpPr>
               <p:cNvPr id="14" name="Content Placeholder 13"/>
@@ -16644,8 +17067,8 @@
           </p:sp>
         </mc:Fallback>
       </mc:AlternateContent>
-      <mc:AlternateContent xmlns:mc="http://schemas.openxmlformats.org/markup-compatibility/2006">
-        <mc:Choice xmlns:a14="http://schemas.microsoft.com/office/drawing/2010/main" Requires="a14">
+      <mc:AlternateContent xmlns:mc="http://schemas.openxmlformats.org/markup-compatibility/2006" xmlns:a14="http://schemas.microsoft.com/office/drawing/2010/main">
+        <mc:Choice Requires="a14">
           <p:sp>
             <p:nvSpPr>
               <p:cNvPr id="15" name="TextBox 14"/>
@@ -16689,7 +17112,7 @@
             </p:txBody>
           </p:sp>
         </mc:Choice>
-        <mc:Fallback>
+        <mc:Fallback xmlns="">
           <p:sp>
             <p:nvSpPr>
               <p:cNvPr id="15" name="TextBox 14"/>
@@ -16928,11 +17351,7 @@
             </a:r>
             <a:r>
               <a:rPr lang="en-US" sz="2600" dirty="0" smtClean="0"/>
-              <a:t> recurrence with real Sylvester equations</a:t>
-            </a:r>
-            <a:r>
-              <a:rPr lang="en-US" sz="2600" dirty="0" smtClean="0"/>
-              <a:t>, </a:t>
+              <a:t> recurrence with real Sylvester equations, </a:t>
             </a:r>
             <a:r>
               <a:rPr lang="en-US" sz="2400" dirty="0" smtClean="0"/>
@@ -17052,8 +17471,8 @@
           </a:prstGeom>
         </p:spPr>
       </p:pic>
-      <mc:AlternateContent xmlns:mc="http://schemas.openxmlformats.org/markup-compatibility/2006">
-        <mc:Choice xmlns:a14="http://schemas.microsoft.com/office/drawing/2010/main" Requires="a14">
+      <mc:AlternateContent xmlns:mc="http://schemas.openxmlformats.org/markup-compatibility/2006" xmlns:a14="http://schemas.microsoft.com/office/drawing/2010/main">
+        <mc:Choice Requires="a14">
           <p:sp>
             <p:nvSpPr>
               <p:cNvPr id="8" name="TextBox 7"/>
@@ -17097,7 +17516,7 @@
             </p:txBody>
           </p:sp>
         </mc:Choice>
-        <mc:Fallback>
+        <mc:Fallback xmlns="">
           <p:sp>
             <p:nvSpPr>
               <p:cNvPr id="8" name="TextBox 7"/>

</xml_diff>

<commit_message>
ratkrylov: Z can be specified manually.
</commit_message>
<xml_diff>
--- a/docs/slides pd2ggaln/MatFun.pptx
+++ b/docs/slides pd2ggaln/MatFun.pptx
@@ -248,7 +248,6 @@
             <c:showLeaderLines val="0"/>
             <c:extLst>
               <c:ext xmlns:c15="http://schemas.microsoft.com/office/drawing/2012/chart" uri="{CE6537A1-D6FC-4f65-9D91-7224C49458BB}">
-                <c15:layout/>
                 <c15:showLeaderLines val="1"/>
                 <c15:leaderLines>
                   <c:spPr>
@@ -323,11 +322,11 @@
         </c:dLbls>
         <c:gapWidth val="150"/>
         <c:overlap val="100"/>
-        <c:axId val="154924752"/>
-        <c:axId val="154925312"/>
+        <c:axId val="111170032"/>
+        <c:axId val="111170592"/>
       </c:barChart>
       <c:catAx>
-        <c:axId val="154924752"/>
+        <c:axId val="111170032"/>
         <c:scaling>
           <c:orientation val="minMax"/>
         </c:scaling>
@@ -367,7 +366,7 @@
             <a:endParaRPr lang="it-IT"/>
           </a:p>
         </c:txPr>
-        <c:crossAx val="154925312"/>
+        <c:crossAx val="111170592"/>
         <c:crosses val="autoZero"/>
         <c:auto val="1"/>
         <c:lblAlgn val="ctr"/>
@@ -375,7 +374,7 @@
         <c:noMultiLvlLbl val="0"/>
       </c:catAx>
       <c:valAx>
-        <c:axId val="154925312"/>
+        <c:axId val="111170592"/>
         <c:scaling>
           <c:orientation val="minMax"/>
         </c:scaling>
@@ -399,7 +398,7 @@
         <c:majorTickMark val="none"/>
         <c:minorTickMark val="none"/>
         <c:tickLblPos val="nextTo"/>
-        <c:crossAx val="154924752"/>
+        <c:crossAx val="111170032"/>
         <c:crosses val="autoZero"/>
         <c:crossBetween val="between"/>
       </c:valAx>
@@ -415,7 +414,6 @@
     </c:plotArea>
     <c:legend>
       <c:legendPos val="b"/>
-      <c:layout/>
       <c:overlay val="0"/>
       <c:spPr>
         <a:noFill/>
@@ -1059,7 +1057,7 @@
           <a:p>
             <a:fld id="{BDB7646E-8811-423A-9C42-2CBFADA00A96}" type="datetimeFigureOut">
               <a:rPr lang="en-US" smtClean="0"/>
-              <a:t>2/7/2018</a:t>
+              <a:t>4/4/2018</a:t>
             </a:fld>
             <a:endParaRPr lang="en-US"/>
           </a:p>
@@ -1233,7 +1231,7 @@
             <a:fld id="{D677E230-58DD-43ED-96A1-552DDAB53532}" type="datetimeFigureOut">
               <a:rPr lang="en-US" smtClean="0"/>
               <a:pPr/>
-              <a:t>2/7/2018</a:t>
+              <a:t>4/4/2018</a:t>
             </a:fld>
             <a:endParaRPr lang="en-US"/>
           </a:p>
@@ -2426,7 +2424,7 @@
             <a:fld id="{C2C6F8EA-316C-41DE-B9A4-EDCC3A85ED9A}" type="datetimeFigureOut">
               <a:rPr lang="en-US" smtClean="0"/>
               <a:pPr/>
-              <a:t>2/7/2018</a:t>
+              <a:t>4/4/2018</a:t>
             </a:fld>
             <a:endParaRPr lang="en-US" dirty="0"/>
           </a:p>
@@ -2650,7 +2648,7 @@
           <a:p>
             <a:fld id="{C2C6F8EA-316C-41DE-B9A4-EDCC3A85ED9A}" type="datetimeFigureOut">
               <a:rPr lang="en-US"/>
-              <a:t>2/7/2018</a:t>
+              <a:t>4/4/2018</a:t>
             </a:fld>
             <a:endParaRPr/>
           </a:p>
@@ -3469,7 +3467,7 @@
           <a:p>
             <a:fld id="{C2C6F8EA-316C-41DE-B9A4-EDCC3A85ED9A}" type="datetimeFigureOut">
               <a:rPr lang="en-US"/>
-              <a:t>2/7/2018</a:t>
+              <a:t>4/4/2018</a:t>
             </a:fld>
             <a:endParaRPr/>
           </a:p>
@@ -3671,7 +3669,7 @@
           <a:p>
             <a:fld id="{C2C6F8EA-316C-41DE-B9A4-EDCC3A85ED9A}" type="datetimeFigureOut">
               <a:rPr lang="en-US"/>
-              <a:t>2/7/2018</a:t>
+              <a:t>4/4/2018</a:t>
             </a:fld>
             <a:endParaRPr dirty="0"/>
           </a:p>
@@ -4938,7 +4936,7 @@
             <a:fld id="{C2C6F8EA-316C-41DE-B9A4-EDCC3A85ED9A}" type="datetimeFigureOut">
               <a:rPr lang="en-US" smtClean="0"/>
               <a:pPr/>
-              <a:t>2/7/2018</a:t>
+              <a:t>4/4/2018</a:t>
             </a:fld>
             <a:endParaRPr lang="en-US" dirty="0"/>
           </a:p>
@@ -5264,7 +5262,7 @@
           <a:p>
             <a:fld id="{C2C6F8EA-316C-41DE-B9A4-EDCC3A85ED9A}" type="datetimeFigureOut">
               <a:rPr lang="en-US"/>
-              <a:t>2/7/2018</a:t>
+              <a:t>4/4/2018</a:t>
             </a:fld>
             <a:endParaRPr/>
           </a:p>
@@ -5716,7 +5714,7 @@
           <a:p>
             <a:fld id="{C2C6F8EA-316C-41DE-B9A4-EDCC3A85ED9A}" type="datetimeFigureOut">
               <a:rPr lang="en-US"/>
-              <a:t>2/7/2018</a:t>
+              <a:t>4/4/2018</a:t>
             </a:fld>
             <a:endParaRPr/>
           </a:p>
@@ -5850,7 +5848,7 @@
           <a:p>
             <a:fld id="{C2C6F8EA-316C-41DE-B9A4-EDCC3A85ED9A}" type="datetimeFigureOut">
               <a:rPr lang="en-US"/>
-              <a:t>2/7/2018</a:t>
+              <a:t>4/4/2018</a:t>
             </a:fld>
             <a:endParaRPr/>
           </a:p>
@@ -6189,7 +6187,7 @@
           <a:p>
             <a:fld id="{C2C6F8EA-316C-41DE-B9A4-EDCC3A85ED9A}" type="datetimeFigureOut">
               <a:rPr lang="en-US"/>
-              <a:t>2/7/2018</a:t>
+              <a:t>4/4/2018</a:t>
             </a:fld>
             <a:endParaRPr/>
           </a:p>
@@ -6685,7 +6683,7 @@
           <a:p>
             <a:fld id="{C2C6F8EA-316C-41DE-B9A4-EDCC3A85ED9A}" type="datetimeFigureOut">
               <a:rPr lang="en-US"/>
-              <a:t>2/7/2018</a:t>
+              <a:t>4/4/2018</a:t>
             </a:fld>
             <a:endParaRPr/>
           </a:p>
@@ -7138,7 +7136,7 @@
             <a:fld id="{C2C6F8EA-316C-41DE-B9A4-EDCC3A85ED9A}" type="datetimeFigureOut">
               <a:rPr lang="en-US" smtClean="0"/>
               <a:pPr/>
-              <a:t>2/7/2018</a:t>
+              <a:t>4/4/2018</a:t>
             </a:fld>
             <a:endParaRPr lang="en-US" dirty="0"/>
           </a:p>
@@ -8041,7 +8039,7 @@
             <a:fld id="{C2C6F8EA-316C-41DE-B9A4-EDCC3A85ED9A}" type="datetimeFigureOut">
               <a:rPr lang="en-US" smtClean="0"/>
               <a:pPr/>
-              <a:t>2/7/2018</a:t>
+              <a:t>4/4/2018</a:t>
             </a:fld>
             <a:endParaRPr lang="en-US" dirty="0"/>
           </a:p>
@@ -8682,8 +8680,8 @@
           </a:p>
         </p:txBody>
       </p:sp>
-      <mc:AlternateContent xmlns:mc="http://schemas.openxmlformats.org/markup-compatibility/2006">
-        <mc:Choice xmlns:a14="http://schemas.microsoft.com/office/drawing/2010/main" Requires="a14">
+      <mc:AlternateContent xmlns:mc="http://schemas.openxmlformats.org/markup-compatibility/2006" xmlns:a14="http://schemas.microsoft.com/office/drawing/2010/main">
+        <mc:Choice Requires="a14">
           <p:sp>
             <p:nvSpPr>
               <p:cNvPr id="14" name="Content Placeholder 13"/>
@@ -10109,7 +10107,7 @@
             </p:txBody>
           </p:sp>
         </mc:Choice>
-        <mc:Fallback>
+        <mc:Fallback xmlns="">
           <p:sp>
             <p:nvSpPr>
               <p:cNvPr id="14" name="Content Placeholder 13"/>
@@ -10501,8 +10499,8 @@
           </a:p>
         </p:txBody>
       </p:sp>
-      <mc:AlternateContent xmlns:mc="http://schemas.openxmlformats.org/markup-compatibility/2006">
-        <mc:Choice xmlns:a14="http://schemas.microsoft.com/office/drawing/2010/main" Requires="a14">
+      <mc:AlternateContent xmlns:mc="http://schemas.openxmlformats.org/markup-compatibility/2006" xmlns:a14="http://schemas.microsoft.com/office/drawing/2010/main">
+        <mc:Choice Requires="a14">
           <p:sp>
             <p:nvSpPr>
               <p:cNvPr id="14" name="Content Placeholder 13"/>
@@ -10554,19 +10552,7 @@
                 </a:pPr>
                 <a:r>
                   <a:rPr lang="en-US" sz="2600" dirty="0" smtClean="0"/>
-                  <a:t>Input</a:t>
-                </a:r>
-                <a:r>
-                  <a:rPr lang="en-US" sz="2600" dirty="0" smtClean="0"/>
-                  <a:t>: function samples (real or complex</a:t>
-                </a:r>
-                <a:r>
-                  <a:rPr lang="en-US" sz="2600" dirty="0" smtClean="0"/>
-                  <a:t>).              Output</a:t>
-                </a:r>
-                <a:r>
-                  <a:rPr lang="en-US" sz="2600" dirty="0" smtClean="0"/>
-                  <a:t>: rational </a:t>
+                  <a:t>Input: function samples (real or complex).              Output: rational </a:t>
                 </a:r>
                 <a:r>
                   <a:rPr lang="en-US" sz="2600" dirty="0" err="1" smtClean="0"/>
@@ -11369,7 +11355,7 @@
             </p:txBody>
           </p:sp>
         </mc:Choice>
-        <mc:Fallback>
+        <mc:Fallback xmlns="">
           <p:sp>
             <p:nvSpPr>
               <p:cNvPr id="14" name="Content Placeholder 13"/>
@@ -12446,7 +12432,7 @@
         </p:nvSpPr>
         <p:spPr>
           <a:xfrm>
-            <a:off x="1593436" y="-243408"/>
+            <a:off x="1593436" y="-27384"/>
             <a:ext cx="9782801" cy="1239837"/>
           </a:xfrm>
         </p:spPr>
@@ -12487,7 +12473,7 @@
             </p:nvSpPr>
             <p:spPr>
               <a:xfrm>
-                <a:off x="1629916" y="1196752"/>
+                <a:off x="1629916" y="1593304"/>
                 <a:ext cx="9782801" cy="4572000"/>
               </a:xfrm>
             </p:spPr>
@@ -12637,7 +12623,7 @@
             </p:nvSpPr>
             <p:spPr>
               <a:xfrm>
-                <a:off x="1629916" y="1196752"/>
+                <a:off x="1629916" y="1593304"/>
                 <a:ext cx="9782801" cy="4572000"/>
               </a:xfrm>
               <a:blipFill rotWithShape="0">
@@ -12671,13 +12657,13 @@
           <p:nvPr>
             <p:extLst>
               <p:ext uri="{D42A27DB-BD31-4B8C-83A1-F6EECF244321}">
-                <p14:modId xmlns:p14="http://schemas.microsoft.com/office/powerpoint/2010/main" val="899411165"/>
+                <p14:modId xmlns:p14="http://schemas.microsoft.com/office/powerpoint/2010/main" val="794801601"/>
               </p:ext>
             </p:extLst>
           </p:nvPr>
         </p:nvGraphicFramePr>
         <p:xfrm>
-          <a:off x="1701924" y="2564904"/>
+          <a:off x="1701924" y="2961456"/>
           <a:ext cx="9649068" cy="3200400"/>
         </p:xfrm>
         <a:graphic>
@@ -12690,14 +12676,14 @@
                 <a:gridCol w="1205934">
                   <a:extLst>
                     <a:ext uri="{9D8B030D-6E8A-4147-A177-3AD203B41FA5}">
-                      <a16:colId xmlns="" xmlns:a16="http://schemas.microsoft.com/office/drawing/2014/main" val="20001"/>
+                      <a16:colId xmlns:a16="http://schemas.microsoft.com/office/drawing/2014/main" xmlns="" val="20001"/>
                     </a:ext>
                   </a:extLst>
                 </a:gridCol>
                 <a:gridCol w="1206162">
                   <a:extLst>
                     <a:ext uri="{9D8B030D-6E8A-4147-A177-3AD203B41FA5}">
-                      <a16:colId xmlns="" xmlns:a16="http://schemas.microsoft.com/office/drawing/2014/main" val="20002"/>
+                      <a16:colId xmlns:a16="http://schemas.microsoft.com/office/drawing/2014/main" xmlns="" val="20002"/>
                     </a:ext>
                   </a:extLst>
                 </a:gridCol>
@@ -12746,8 +12732,12 @@
                     <a:p>
                       <a:pPr algn="ctr"/>
                       <a:r>
+                        <a:rPr lang="en-US" dirty="0" err="1" smtClean="0"/>
+                        <a:t>cond</a:t>
+                      </a:r>
+                      <a:r>
                         <a:rPr lang="en-US" dirty="0" smtClean="0"/>
-                        <a:t>size(A)</a:t>
+                        <a:t>(A)</a:t>
                       </a:r>
                       <a:endParaRPr lang="en-US" dirty="0"/>
                     </a:p>
@@ -12761,12 +12751,45 @@
                     <a:p>
                       <a:pPr algn="ctr"/>
                       <a:r>
-                        <a:rPr lang="en-US" dirty="0" err="1" smtClean="0"/>
+                        <a:rPr lang="it-IT" dirty="0" smtClean="0"/>
                         <a:t>cond</a:t>
                       </a:r>
+                    </a:p>
+                    <a:p>
+                      <a:pPr algn="ctr"/>
+                      <a:r>
+                        <a:rPr lang="it-IT" dirty="0" smtClean="0"/>
+                        <a:t>(exp, A)</a:t>
+                      </a:r>
+                      <a:endParaRPr lang="it-IT" dirty="0"/>
+                    </a:p>
+                  </a:txBody>
+                  <a:tcPr anchor="ctr"/>
+                </a:tc>
+                <a:tc>
+                  <a:txBody>
+                    <a:bodyPr/>
+                    <a:lstStyle/>
+                    <a:p>
+                      <a:pPr algn="ctr"/>
                       <a:r>
                         <a:rPr lang="en-US" dirty="0" smtClean="0"/>
-                        <a:t>(A)</a:t>
+                        <a:t># poles</a:t>
+                      </a:r>
+                      <a:endParaRPr lang="en-US" dirty="0"/>
+                    </a:p>
+                  </a:txBody>
+                  <a:tcPr anchor="ctr"/>
+                </a:tc>
+                <a:tc>
+                  <a:txBody>
+                    <a:bodyPr/>
+                    <a:lstStyle/>
+                    <a:p>
+                      <a:pPr algn="ctr"/>
+                      <a:r>
+                        <a:rPr lang="en-US" dirty="0" smtClean="0"/>
+                        <a:t>error</a:t>
                       </a:r>
                       <a:endParaRPr lang="en-US" dirty="0"/>
                     </a:p>
@@ -12796,37 +12819,7 @@
                       <a:pPr algn="ctr"/>
                       <a:r>
                         <a:rPr lang="en-US" dirty="0" smtClean="0"/>
-                        <a:t>accuracy</a:t>
-                      </a:r>
-                      <a:endParaRPr lang="en-US" dirty="0"/>
-                    </a:p>
-                  </a:txBody>
-                  <a:tcPr anchor="ctr"/>
-                </a:tc>
-                <a:tc>
-                  <a:txBody>
-                    <a:bodyPr/>
-                    <a:lstStyle/>
-                    <a:p>
-                      <a:pPr algn="ctr"/>
-                      <a:r>
-                        <a:rPr lang="en-US" dirty="0" smtClean="0"/>
-                        <a:t># poles</a:t>
-                      </a:r>
-                      <a:endParaRPr lang="en-US" dirty="0"/>
-                    </a:p>
-                  </a:txBody>
-                  <a:tcPr anchor="ctr"/>
-                </a:tc>
-                <a:tc>
-                  <a:txBody>
-                    <a:bodyPr/>
-                    <a:lstStyle/>
-                    <a:p>
-                      <a:pPr algn="ctr"/>
-                      <a:r>
-                        <a:rPr lang="en-US" dirty="0" smtClean="0"/>
-                        <a:t>accuracy</a:t>
+                        <a:t>error</a:t>
                       </a:r>
                       <a:endParaRPr lang="en-US" dirty="0"/>
                     </a:p>
@@ -12835,7 +12828,7 @@
                 </a:tc>
                 <a:extLst>
                   <a:ext uri="{0D108BD9-81ED-4DB2-BD59-A6C34878D82A}">
-                    <a16:rowId xmlns="" xmlns:a16="http://schemas.microsoft.com/office/drawing/2014/main" val="10000"/>
+                    <a16:rowId xmlns:a16="http://schemas.microsoft.com/office/drawing/2014/main" xmlns="" val="10000"/>
                   </a:ext>
                 </a:extLst>
               </a:tr>
@@ -12880,32 +12873,11 @@
                     <a:p>
                       <a:pPr algn="ctr"/>
                       <a:r>
-                        <a:rPr lang="en-US" dirty="0" err="1" smtClean="0">
-                          <a:latin typeface="Cambria Math" panose="02040503050406030204" pitchFamily="18" charset="0"/>
-                          <a:ea typeface="Cambria Math" panose="02040503050406030204" pitchFamily="18" charset="0"/>
-                        </a:rPr>
-                        <a:t>jagmesh</a:t>
-                      </a:r>
-                      <a:endParaRPr lang="en-US" dirty="0">
-                        <a:latin typeface="Cambria Math" panose="02040503050406030204" pitchFamily="18" charset="0"/>
-                        <a:ea typeface="Cambria Math" panose="02040503050406030204" pitchFamily="18" charset="0"/>
-                      </a:endParaRPr>
-                    </a:p>
-                  </a:txBody>
-                  <a:tcPr anchor="ctr"/>
-                </a:tc>
-                <a:tc>
-                  <a:txBody>
-                    <a:bodyPr/>
-                    <a:lstStyle/>
-                    <a:p>
-                      <a:pPr algn="ctr"/>
-                      <a:r>
                         <a:rPr lang="en-US" dirty="0" smtClean="0">
                           <a:latin typeface="Cambria Math" panose="02040503050406030204" pitchFamily="18" charset="0"/>
                           <a:ea typeface="Cambria Math" panose="02040503050406030204" pitchFamily="18" charset="0"/>
                         </a:rPr>
-                        <a:t>1089</a:t>
+                        <a:t>jagmesh3</a:t>
                       </a:r>
                       <a:endParaRPr lang="en-US" dirty="0">
                         <a:latin typeface="Cambria Math" panose="02040503050406030204" pitchFamily="18" charset="0"/>
@@ -12929,6 +12901,27 @@
                         <a:t>1168</a:t>
                       </a:r>
                       <a:endParaRPr lang="en-US" dirty="0">
+                        <a:latin typeface="Cambria Math" panose="02040503050406030204" pitchFamily="18" charset="0"/>
+                        <a:ea typeface="Cambria Math" panose="02040503050406030204" pitchFamily="18" charset="0"/>
+                      </a:endParaRPr>
+                    </a:p>
+                  </a:txBody>
+                  <a:tcPr anchor="ctr"/>
+                </a:tc>
+                <a:tc>
+                  <a:txBody>
+                    <a:bodyPr/>
+                    <a:lstStyle/>
+                    <a:p>
+                      <a:pPr algn="ctr"/>
+                      <a:r>
+                        <a:rPr lang="it-IT" dirty="0" smtClean="0">
+                          <a:latin typeface="Cambria Math" panose="02040503050406030204" pitchFamily="18" charset="0"/>
+                          <a:ea typeface="Cambria Math" panose="02040503050406030204" pitchFamily="18" charset="0"/>
+                        </a:rPr>
+                        <a:t>7.0e0</a:t>
+                      </a:r>
+                      <a:endParaRPr lang="it-IT" dirty="0">
                         <a:latin typeface="Cambria Math" panose="02040503050406030204" pitchFamily="18" charset="0"/>
                         <a:ea typeface="Cambria Math" panose="02040503050406030204" pitchFamily="18" charset="0"/>
                       </a:endParaRPr>
@@ -13022,7 +13015,7 @@
                 </a:tc>
                 <a:extLst>
                   <a:ext uri="{0D108BD9-81ED-4DB2-BD59-A6C34878D82A}">
-                    <a16:rowId xmlns="" xmlns:a16="http://schemas.microsoft.com/office/drawing/2014/main" val="10001"/>
+                    <a16:rowId xmlns:a16="http://schemas.microsoft.com/office/drawing/2014/main" xmlns="" val="10001"/>
                   </a:ext>
                 </a:extLst>
               </a:tr>
@@ -13092,7 +13085,7 @@
                           <a:latin typeface="Cambria Math" panose="02040503050406030204" pitchFamily="18" charset="0"/>
                           <a:ea typeface="Cambria Math" panose="02040503050406030204" pitchFamily="18" charset="0"/>
                         </a:rPr>
-                        <a:t>1104</a:t>
+                        <a:t>2178</a:t>
                       </a:r>
                       <a:endParaRPr lang="en-US" dirty="0">
                         <a:latin typeface="Cambria Math" panose="02040503050406030204" pitchFamily="18" charset="0"/>
@@ -13109,13 +13102,13 @@
                     <a:p>
                       <a:pPr algn="ctr"/>
                       <a:r>
-                        <a:rPr lang="en-US" dirty="0" smtClean="0">
+                        <a:rPr lang="it-IT" dirty="0" smtClean="0">
                           <a:latin typeface="Cambria Math" panose="02040503050406030204" pitchFamily="18" charset="0"/>
                           <a:ea typeface="Cambria Math" panose="02040503050406030204" pitchFamily="18" charset="0"/>
                         </a:rPr>
-                        <a:t>2178</a:t>
+                        <a:t>1.2e2</a:t>
                       </a:r>
-                      <a:endParaRPr lang="en-US" dirty="0">
+                      <a:endParaRPr lang="it-IT" dirty="0">
                         <a:latin typeface="Cambria Math" panose="02040503050406030204" pitchFamily="18" charset="0"/>
                         <a:ea typeface="Cambria Math" panose="02040503050406030204" pitchFamily="18" charset="0"/>
                       </a:endParaRPr>
@@ -13209,7 +13202,7 @@
                 </a:tc>
                 <a:extLst>
                   <a:ext uri="{0D108BD9-81ED-4DB2-BD59-A6C34878D82A}">
-                    <a16:rowId xmlns="" xmlns:a16="http://schemas.microsoft.com/office/drawing/2014/main" val="10002"/>
+                    <a16:rowId xmlns:a16="http://schemas.microsoft.com/office/drawing/2014/main" xmlns="" val="10002"/>
                   </a:ext>
                 </a:extLst>
               </a:tr>
@@ -13290,7 +13283,7 @@
                           <a:latin typeface="Cambria Math" panose="02040503050406030204" pitchFamily="18" charset="0"/>
                           <a:ea typeface="Cambria Math" panose="02040503050406030204" pitchFamily="18" charset="0"/>
                         </a:rPr>
-                        <a:t>1072</a:t>
+                        <a:t>2.0e34</a:t>
                       </a:r>
                       <a:endParaRPr lang="en-US" dirty="0">
                         <a:latin typeface="Cambria Math" panose="02040503050406030204" pitchFamily="18" charset="0"/>
@@ -13307,13 +13300,13 @@
                     <a:p>
                       <a:pPr algn="ctr"/>
                       <a:r>
-                        <a:rPr lang="en-US" dirty="0" smtClean="0">
+                        <a:rPr lang="it-IT" dirty="0" smtClean="0">
                           <a:latin typeface="Cambria Math" panose="02040503050406030204" pitchFamily="18" charset="0"/>
                           <a:ea typeface="Cambria Math" panose="02040503050406030204" pitchFamily="18" charset="0"/>
                         </a:rPr>
-                        <a:t>2.0e34</a:t>
+                        <a:t>3.4e1</a:t>
                       </a:r>
-                      <a:endParaRPr lang="en-US" dirty="0">
+                      <a:endParaRPr lang="it-IT" dirty="0">
                         <a:latin typeface="Cambria Math" panose="02040503050406030204" pitchFamily="18" charset="0"/>
                         <a:ea typeface="Cambria Math" panose="02040503050406030204" pitchFamily="18" charset="0"/>
                       </a:endParaRPr>
@@ -13407,7 +13400,7 @@
                 </a:tc>
                 <a:extLst>
                   <a:ext uri="{0D108BD9-81ED-4DB2-BD59-A6C34878D82A}">
-                    <a16:rowId xmlns="" xmlns:a16="http://schemas.microsoft.com/office/drawing/2014/main" val="10003"/>
+                    <a16:rowId xmlns:a16="http://schemas.microsoft.com/office/drawing/2014/main" xmlns="" val="10003"/>
                   </a:ext>
                 </a:extLst>
               </a:tr>
@@ -13473,11 +13466,11 @@
                     <a:p>
                       <a:pPr algn="ctr"/>
                       <a:r>
-                        <a:rPr lang="en-US" dirty="0" smtClean="0">
+                        <a:rPr lang="en-US" dirty="0" err="1" smtClean="0">
                           <a:latin typeface="Cambria Math" panose="02040503050406030204" pitchFamily="18" charset="0"/>
                           <a:ea typeface="Cambria Math" panose="02040503050406030204" pitchFamily="18" charset="0"/>
                         </a:rPr>
-                        <a:t>1059</a:t>
+                        <a:t>Inf</a:t>
                       </a:r>
                       <a:endParaRPr lang="en-US" dirty="0">
                         <a:latin typeface="Cambria Math" panose="02040503050406030204" pitchFamily="18" charset="0"/>
@@ -13494,13 +13487,13 @@
                     <a:p>
                       <a:pPr algn="ctr"/>
                       <a:r>
-                        <a:rPr lang="en-US" dirty="0" err="1" smtClean="0">
+                        <a:rPr lang="it-IT" dirty="0" smtClean="0">
                           <a:latin typeface="Cambria Math" panose="02040503050406030204" pitchFamily="18" charset="0"/>
                           <a:ea typeface="Cambria Math" panose="02040503050406030204" pitchFamily="18" charset="0"/>
                         </a:rPr>
-                        <a:t>Inf</a:t>
+                        <a:t>7.8e1</a:t>
                       </a:r>
-                      <a:endParaRPr lang="en-US" dirty="0">
+                      <a:endParaRPr lang="it-IT" dirty="0">
                         <a:latin typeface="Cambria Math" panose="02040503050406030204" pitchFamily="18" charset="0"/>
                         <a:ea typeface="Cambria Math" panose="02040503050406030204" pitchFamily="18" charset="0"/>
                       </a:endParaRPr>
@@ -13597,299 +13590,6 @@
           </a:graphicData>
         </a:graphic>
       </p:graphicFrame>
-      <mc:AlternateContent xmlns:mc="http://schemas.openxmlformats.org/markup-compatibility/2006" xmlns:a14="http://schemas.microsoft.com/office/drawing/2010/main">
-        <mc:Choice Requires="a14">
-          <p:sp>
-            <p:nvSpPr>
-              <p:cNvPr id="6" name="Content Placeholder 13"/>
-              <p:cNvSpPr txBox="1">
-                <a:spLocks/>
-              </p:cNvSpPr>
-              <p:nvPr/>
-            </p:nvSpPr>
-            <p:spPr>
-              <a:xfrm>
-                <a:off x="1629915" y="6021288"/>
-                <a:ext cx="9782801" cy="4572000"/>
-              </a:xfrm>
-              <a:prstGeom prst="rect">
-                <a:avLst/>
-              </a:prstGeom>
-            </p:spPr>
-            <p:txBody>
-              <a:bodyPr vert="horz" lIns="91440" tIns="45720" rIns="91440" bIns="45720" rtlCol="0">
-                <a:normAutofit/>
-              </a:bodyPr>
-              <a:lstStyle>
-                <a:lvl1pPr marL="246888" indent="-246888" algn="l" defTabSz="914400" rtl="0" eaLnBrk="1" latinLnBrk="0" hangingPunct="1">
-                  <a:lnSpc>
-                    <a:spcPct val="90000"/>
-                  </a:lnSpc>
-                  <a:spcBef>
-                    <a:spcPts val="1400"/>
-                  </a:spcBef>
-                  <a:buFont typeface="Euphemia" pitchFamily="34" charset="0"/>
-                  <a:buChar char="›"/>
-                  <a:defRPr sz="2800" kern="1200">
-                    <a:solidFill>
-                      <a:schemeClr val="tx1"/>
-                    </a:solidFill>
-                    <a:latin typeface="+mn-lt"/>
-                    <a:ea typeface="+mn-ea"/>
-                    <a:cs typeface="+mn-cs"/>
-                  </a:defRPr>
-                </a:lvl1pPr>
-                <a:lvl2pPr marL="612648" indent="-246888" algn="l" defTabSz="914400" rtl="0" eaLnBrk="1" latinLnBrk="0" hangingPunct="1">
-                  <a:lnSpc>
-                    <a:spcPct val="90000"/>
-                  </a:lnSpc>
-                  <a:spcBef>
-                    <a:spcPts val="600"/>
-                  </a:spcBef>
-                  <a:buFont typeface="Euphemia" pitchFamily="34" charset="0"/>
-                  <a:buChar char="–"/>
-                  <a:defRPr sz="2400" kern="1200">
-                    <a:solidFill>
-                      <a:schemeClr val="tx1"/>
-                    </a:solidFill>
-                    <a:latin typeface="+mn-lt"/>
-                    <a:ea typeface="+mn-ea"/>
-                    <a:cs typeface="+mn-cs"/>
-                  </a:defRPr>
-                </a:lvl2pPr>
-                <a:lvl3pPr marL="978408" indent="-246888" algn="l" defTabSz="914400" rtl="0" eaLnBrk="1" latinLnBrk="0" hangingPunct="1">
-                  <a:lnSpc>
-                    <a:spcPct val="90000"/>
-                  </a:lnSpc>
-                  <a:spcBef>
-                    <a:spcPts val="600"/>
-                  </a:spcBef>
-                  <a:buFont typeface="Euphemia" pitchFamily="34" charset="0"/>
-                  <a:buChar char="›"/>
-                  <a:defRPr sz="2000" kern="1200">
-                    <a:solidFill>
-                      <a:schemeClr val="tx1"/>
-                    </a:solidFill>
-                    <a:latin typeface="+mn-lt"/>
-                    <a:ea typeface="+mn-ea"/>
-                    <a:cs typeface="+mn-cs"/>
-                  </a:defRPr>
-                </a:lvl3pPr>
-                <a:lvl4pPr marL="1344168" indent="-246888" algn="l" defTabSz="914400" rtl="0" eaLnBrk="1" latinLnBrk="0" hangingPunct="1">
-                  <a:lnSpc>
-                    <a:spcPct val="90000"/>
-                  </a:lnSpc>
-                  <a:spcBef>
-                    <a:spcPts val="600"/>
-                  </a:spcBef>
-                  <a:buFont typeface="Arial" pitchFamily="34" charset="0"/>
-                  <a:buChar char="–"/>
-                  <a:defRPr sz="1800" kern="1200">
-                    <a:solidFill>
-                      <a:schemeClr val="tx1"/>
-                    </a:solidFill>
-                    <a:latin typeface="+mn-lt"/>
-                    <a:ea typeface="+mn-ea"/>
-                    <a:cs typeface="+mn-cs"/>
-                  </a:defRPr>
-                </a:lvl4pPr>
-                <a:lvl5pPr marL="1709928" indent="-246888" algn="l" defTabSz="914400" rtl="0" eaLnBrk="1" latinLnBrk="0" hangingPunct="1">
-                  <a:lnSpc>
-                    <a:spcPct val="90000"/>
-                  </a:lnSpc>
-                  <a:spcBef>
-                    <a:spcPts val="600"/>
-                  </a:spcBef>
-                  <a:buFont typeface="Euphemia" pitchFamily="34" charset="0"/>
-                  <a:buChar char="›"/>
-                  <a:defRPr sz="1800" kern="1200">
-                    <a:solidFill>
-                      <a:schemeClr val="tx1"/>
-                    </a:solidFill>
-                    <a:latin typeface="+mn-lt"/>
-                    <a:ea typeface="+mn-ea"/>
-                    <a:cs typeface="+mn-cs"/>
-                  </a:defRPr>
-                </a:lvl5pPr>
-                <a:lvl6pPr marL="2075688" indent="-246888" algn="l" defTabSz="914400" rtl="0" eaLnBrk="1" latinLnBrk="0" hangingPunct="1">
-                  <a:lnSpc>
-                    <a:spcPct val="90000"/>
-                  </a:lnSpc>
-                  <a:spcBef>
-                    <a:spcPts val="600"/>
-                  </a:spcBef>
-                  <a:buFont typeface="Euphemia" pitchFamily="34" charset="0"/>
-                  <a:buChar char="–"/>
-                  <a:defRPr sz="1800" kern="1200">
-                    <a:solidFill>
-                      <a:schemeClr val="tx1"/>
-                    </a:solidFill>
-                    <a:latin typeface="+mn-lt"/>
-                    <a:ea typeface="+mn-ea"/>
-                    <a:cs typeface="+mn-cs"/>
-                  </a:defRPr>
-                </a:lvl6pPr>
-                <a:lvl7pPr marL="2441448" indent="-246888" algn="l" defTabSz="914400" rtl="0" eaLnBrk="1" latinLnBrk="0" hangingPunct="1">
-                  <a:lnSpc>
-                    <a:spcPct val="90000"/>
-                  </a:lnSpc>
-                  <a:spcBef>
-                    <a:spcPts val="600"/>
-                  </a:spcBef>
-                  <a:buFont typeface="Euphemia" pitchFamily="34" charset="0"/>
-                  <a:buChar char="›"/>
-                  <a:defRPr sz="1800" kern="1200">
-                    <a:solidFill>
-                      <a:schemeClr val="tx1"/>
-                    </a:solidFill>
-                    <a:latin typeface="+mn-lt"/>
-                    <a:ea typeface="+mn-ea"/>
-                    <a:cs typeface="+mn-cs"/>
-                  </a:defRPr>
-                </a:lvl7pPr>
-                <a:lvl8pPr marL="2807208" indent="-246888" algn="l" defTabSz="914400" rtl="0" eaLnBrk="1" latinLnBrk="0" hangingPunct="1">
-                  <a:lnSpc>
-                    <a:spcPct val="90000"/>
-                  </a:lnSpc>
-                  <a:spcBef>
-                    <a:spcPts val="600"/>
-                  </a:spcBef>
-                  <a:buFont typeface="Euphemia" pitchFamily="34" charset="0"/>
-                  <a:buChar char="–"/>
-                  <a:defRPr sz="1800" kern="1200" baseline="0">
-                    <a:solidFill>
-                      <a:schemeClr val="tx1"/>
-                    </a:solidFill>
-                    <a:latin typeface="+mn-lt"/>
-                    <a:ea typeface="+mn-ea"/>
-                    <a:cs typeface="+mn-cs"/>
-                  </a:defRPr>
-                </a:lvl8pPr>
-                <a:lvl9pPr marL="3172968" indent="-246888" algn="l" defTabSz="914400" rtl="0" eaLnBrk="1" latinLnBrk="0" hangingPunct="1">
-                  <a:lnSpc>
-                    <a:spcPct val="90000"/>
-                  </a:lnSpc>
-                  <a:spcBef>
-                    <a:spcPts val="600"/>
-                  </a:spcBef>
-                  <a:buFont typeface="Euphemia" pitchFamily="34" charset="0"/>
-                  <a:buChar char="›"/>
-                  <a:defRPr sz="1800" kern="1200" baseline="0">
-                    <a:solidFill>
-                      <a:schemeClr val="tx1"/>
-                    </a:solidFill>
-                    <a:latin typeface="+mn-lt"/>
-                    <a:ea typeface="+mn-ea"/>
-                    <a:cs typeface="+mn-cs"/>
-                  </a:defRPr>
-                </a:lvl9pPr>
-              </a:lstStyle>
-              <a:p>
-                <a:pPr marL="0" indent="0">
-                  <a:lnSpc>
-                    <a:spcPct val="120000"/>
-                  </a:lnSpc>
-                  <a:buFont typeface="Euphemia" pitchFamily="34" charset="0"/>
-                  <a:buNone/>
-                </a:pPr>
-                <a:r>
-                  <a:rPr lang="en-US" sz="2200" dirty="0" smtClean="0"/>
-                  <a:t>I haven’t implemented the estimator of </a:t>
-                </a:r>
-                <a14:m>
-                  <m:oMath xmlns:m="http://schemas.openxmlformats.org/officeDocument/2006/math">
-                    <m:r>
-                      <a:rPr lang="en-US" sz="2200" i="1" dirty="0" smtClean="0">
-                        <a:latin typeface="Cambria Math" panose="02040503050406030204" pitchFamily="18" charset="0"/>
-                      </a:rPr>
-                      <m:t>𝑐𝑜𝑛𝑑</m:t>
-                    </m:r>
-                    <m:r>
-                      <a:rPr lang="en-US" sz="2200" i="1" dirty="0" smtClean="0">
-                        <a:latin typeface="Cambria Math" panose="02040503050406030204" pitchFamily="18" charset="0"/>
-                      </a:rPr>
-                      <m:t>(</m:t>
-                    </m:r>
-                    <m:r>
-                      <a:rPr lang="en-US" sz="2200" i="1" dirty="0" smtClean="0">
-                        <a:latin typeface="Cambria Math" panose="02040503050406030204" pitchFamily="18" charset="0"/>
-                      </a:rPr>
-                      <m:t>𝑓</m:t>
-                    </m:r>
-                    <m:r>
-                      <a:rPr lang="en-US" sz="2200" i="1" dirty="0" smtClean="0">
-                        <a:latin typeface="Cambria Math" panose="02040503050406030204" pitchFamily="18" charset="0"/>
-                      </a:rPr>
-                      <m:t>(</m:t>
-                    </m:r>
-                    <m:r>
-                      <a:rPr lang="en-US" sz="2200" i="1" dirty="0" smtClean="0">
-                        <a:latin typeface="Cambria Math" panose="02040503050406030204" pitchFamily="18" charset="0"/>
-                      </a:rPr>
-                      <m:t>𝐴</m:t>
-                    </m:r>
-                    <m:r>
-                      <a:rPr lang="en-US" sz="2200" i="1" dirty="0" smtClean="0">
-                        <a:latin typeface="Cambria Math" panose="02040503050406030204" pitchFamily="18" charset="0"/>
-                      </a:rPr>
-                      <m:t>))</m:t>
-                    </m:r>
-                  </m:oMath>
-                </a14:m>
-                <a:r>
-                  <a:rPr lang="en-US" sz="2200" dirty="0" smtClean="0"/>
-                  <a:t> yet </a:t>
-                </a:r>
-                <a:r>
-                  <a:rPr lang="en-US" sz="2200" dirty="0" smtClean="0">
-                    <a:sym typeface="Wingdings" panose="05000000000000000000" pitchFamily="2" charset="2"/>
-                  </a:rPr>
-                  <a:t></a:t>
-                </a:r>
-                <a:endParaRPr lang="en-US" sz="2200" dirty="0"/>
-              </a:p>
-            </p:txBody>
-          </p:sp>
-        </mc:Choice>
-        <mc:Fallback xmlns="">
-          <p:sp>
-            <p:nvSpPr>
-              <p:cNvPr id="6" name="Content Placeholder 13"/>
-              <p:cNvSpPr txBox="1">
-                <a:spLocks noRot="1" noChangeAspect="1" noMove="1" noResize="1" noEditPoints="1" noAdjustHandles="1" noChangeArrowheads="1" noChangeShapeType="1" noTextEdit="1"/>
-              </p:cNvSpPr>
-              <p:nvPr/>
-            </p:nvSpPr>
-            <p:spPr>
-              <a:xfrm>
-                <a:off x="1629915" y="6021288"/>
-                <a:ext cx="9782801" cy="4572000"/>
-              </a:xfrm>
-              <a:prstGeom prst="rect">
-                <a:avLst/>
-              </a:prstGeom>
-              <a:blipFill rotWithShape="0">
-                <a:blip r:embed="rId3"/>
-                <a:stretch>
-                  <a:fillRect l="-810" t="-400"/>
-                </a:stretch>
-              </a:blipFill>
-            </p:spPr>
-            <p:txBody>
-              <a:bodyPr/>
-              <a:lstStyle/>
-              <a:p>
-                <a:r>
-                  <a:rPr lang="it-IT">
-                    <a:noFill/>
-                  </a:rPr>
-                  <a:t> </a:t>
-                </a:r>
-              </a:p>
-            </p:txBody>
-          </p:sp>
-        </mc:Fallback>
-      </mc:AlternateContent>
     </p:spTree>
     <p:extLst>
       <p:ext uri="{BB962C8B-B14F-4D97-AF65-F5344CB8AC3E}">
@@ -14134,11 +13834,7 @@
             </a:r>
             <a:r>
               <a:rPr lang="en-US" dirty="0" smtClean="0"/>
-              <a:t>egree thesis under supervision of </a:t>
-            </a:r>
-            <a:r>
-              <a:rPr lang="en-US" dirty="0" smtClean="0"/>
-              <a:t>Federico </a:t>
+              <a:t>egree thesis under supervision of Federico </a:t>
             </a:r>
             <a:r>
               <a:rPr lang="en-US" dirty="0" err="1" smtClean="0"/>
@@ -14923,8 +14619,8 @@
           </a:p>
         </p:txBody>
       </p:sp>
-      <mc:AlternateContent xmlns:mc="http://schemas.openxmlformats.org/markup-compatibility/2006">
-        <mc:Choice xmlns:a14="http://schemas.microsoft.com/office/drawing/2010/main" Requires="a14">
+      <mc:AlternateContent xmlns:mc="http://schemas.openxmlformats.org/markup-compatibility/2006" xmlns:a14="http://schemas.microsoft.com/office/drawing/2010/main">
+        <mc:Choice Requires="a14">
           <p:sp>
             <p:nvSpPr>
               <p:cNvPr id="14" name="Content Placeholder 13"/>
@@ -15643,7 +15339,7 @@
             </p:txBody>
           </p:sp>
         </mc:Choice>
-        <mc:Fallback>
+        <mc:Fallback xmlns="">
           <p:sp>
             <p:nvSpPr>
               <p:cNvPr id="14" name="Content Placeholder 13"/>
@@ -15711,8 +15407,8 @@
           </a:prstGeom>
         </p:spPr>
       </p:pic>
-      <mc:AlternateContent xmlns:mc="http://schemas.openxmlformats.org/markup-compatibility/2006">
-        <mc:Choice xmlns:a14="http://schemas.microsoft.com/office/drawing/2010/main" Requires="a14">
+      <mc:AlternateContent xmlns:mc="http://schemas.openxmlformats.org/markup-compatibility/2006" xmlns:a14="http://schemas.microsoft.com/office/drawing/2010/main">
+        <mc:Choice Requires="a14">
           <p:sp>
             <p:nvSpPr>
               <p:cNvPr id="5" name="Content Placeholder 13"/>
@@ -15971,7 +15667,7 @@
             </p:txBody>
           </p:sp>
         </mc:Choice>
-        <mc:Fallback>
+        <mc:Fallback xmlns="">
           <p:sp>
             <p:nvSpPr>
               <p:cNvPr id="5" name="Content Placeholder 13"/>
@@ -16742,21 +16438,21 @@
                 <a:gridCol w="756560">
                   <a:extLst>
                     <a:ext uri="{9D8B030D-6E8A-4147-A177-3AD203B41FA5}">
-                      <a16:colId xmlns="" xmlns:a16="http://schemas.microsoft.com/office/drawing/2014/main" val="20000"/>
+                      <a16:colId xmlns:a16="http://schemas.microsoft.com/office/drawing/2014/main" xmlns="" val="20000"/>
                     </a:ext>
                   </a:extLst>
                 </a:gridCol>
                 <a:gridCol w="1584176">
                   <a:extLst>
                     <a:ext uri="{9D8B030D-6E8A-4147-A177-3AD203B41FA5}">
-                      <a16:colId xmlns="" xmlns:a16="http://schemas.microsoft.com/office/drawing/2014/main" val="20001"/>
+                      <a16:colId xmlns:a16="http://schemas.microsoft.com/office/drawing/2014/main" xmlns="" val="20001"/>
                     </a:ext>
                   </a:extLst>
                 </a:gridCol>
                 <a:gridCol w="1584479">
                   <a:extLst>
                     <a:ext uri="{9D8B030D-6E8A-4147-A177-3AD203B41FA5}">
-                      <a16:colId xmlns="" xmlns:a16="http://schemas.microsoft.com/office/drawing/2014/main" val="20002"/>
+                      <a16:colId xmlns:a16="http://schemas.microsoft.com/office/drawing/2014/main" xmlns="" val="20002"/>
                     </a:ext>
                   </a:extLst>
                 </a:gridCol>
@@ -16815,7 +16511,7 @@
                 </a:tc>
                 <a:extLst>
                   <a:ext uri="{0D108BD9-81ED-4DB2-BD59-A6C34878D82A}">
-                    <a16:rowId xmlns="" xmlns:a16="http://schemas.microsoft.com/office/drawing/2014/main" val="10000"/>
+                    <a16:rowId xmlns:a16="http://schemas.microsoft.com/office/drawing/2014/main" xmlns="" val="10000"/>
                   </a:ext>
                 </a:extLst>
               </a:tr>
@@ -16890,7 +16586,7 @@
                 </a:tc>
                 <a:extLst>
                   <a:ext uri="{0D108BD9-81ED-4DB2-BD59-A6C34878D82A}">
-                    <a16:rowId xmlns="" xmlns:a16="http://schemas.microsoft.com/office/drawing/2014/main" val="10001"/>
+                    <a16:rowId xmlns:a16="http://schemas.microsoft.com/office/drawing/2014/main" xmlns="" val="10001"/>
                   </a:ext>
                 </a:extLst>
               </a:tr>
@@ -16965,7 +16661,7 @@
                 </a:tc>
                 <a:extLst>
                   <a:ext uri="{0D108BD9-81ED-4DB2-BD59-A6C34878D82A}">
-                    <a16:rowId xmlns="" xmlns:a16="http://schemas.microsoft.com/office/drawing/2014/main" val="10002"/>
+                    <a16:rowId xmlns:a16="http://schemas.microsoft.com/office/drawing/2014/main" xmlns="" val="10002"/>
                   </a:ext>
                 </a:extLst>
               </a:tr>
@@ -17040,7 +16736,7 @@
                 </a:tc>
                 <a:extLst>
                   <a:ext uri="{0D108BD9-81ED-4DB2-BD59-A6C34878D82A}">
-                    <a16:rowId xmlns="" xmlns:a16="http://schemas.microsoft.com/office/drawing/2014/main" val="10003"/>
+                    <a16:rowId xmlns:a16="http://schemas.microsoft.com/office/drawing/2014/main" xmlns="" val="10003"/>
                   </a:ext>
                 </a:extLst>
               </a:tr>

</xml_diff>

<commit_message>
thesis and slides added.
</commit_message>
<xml_diff>
--- a/docs/slides pd2ggaln/MatFun.pptx
+++ b/docs/slides pd2ggaln/MatFun.pptx
@@ -198,7 +198,7 @@
               <c:strCache>
                 <c:ptCount val="1"/>
                 <c:pt idx="0">
-                  <c:v>Execution time (s) on randn(2500, 2500)</c:v>
+                  <c:v>Execution time (s) on randn(2500, 2500)+200*eye(2500)</c:v>
                 </c:pt>
               </c:strCache>
             </c:strRef>
@@ -218,6 +218,33 @@
           </c:spPr>
           <c:invertIfNegative val="0"/>
           <c:dLbls>
+            <c:dLbl>
+              <c:idx val="2"/>
+              <c:layout/>
+              <c:tx>
+                <c:rich>
+                  <a:bodyPr/>
+                  <a:lstStyle/>
+                  <a:p>
+                    <a:r>
+                      <a:rPr lang="en-US" smtClean="0"/>
+                      <a:t>48</a:t>
+                    </a:r>
+                  </a:p>
+                </c:rich>
+              </c:tx>
+              <c:showLegendKey val="0"/>
+              <c:showVal val="1"/>
+              <c:showCatName val="0"/>
+              <c:showSerName val="0"/>
+              <c:showPercent val="0"/>
+              <c:showBubbleSize val="0"/>
+              <c:extLst>
+                <c:ext xmlns:c15="http://schemas.microsoft.com/office/drawing/2012/chart" uri="{CE6537A1-D6FC-4f65-9D91-7224C49458BB}">
+                  <c15:layout/>
+                </c:ext>
+              </c:extLst>
+            </c:dLbl>
             <c:spPr>
               <a:noFill/>
               <a:ln>
@@ -298,13 +325,13 @@
                 <c:formatCode>General</c:formatCode>
                 <c:ptCount val="4"/>
                 <c:pt idx="0">
-                  <c:v>69</c:v>
+                  <c:v>68</c:v>
                 </c:pt>
                 <c:pt idx="1">
-                  <c:v>293</c:v>
+                  <c:v>206</c:v>
                 </c:pt>
                 <c:pt idx="2">
-                  <c:v>46</c:v>
+                  <c:v>48</c:v>
                 </c:pt>
                 <c:pt idx="3">
                   <c:v>67</c:v>
@@ -328,11 +355,11 @@
         </c:dLbls>
         <c:gapWidth val="150"/>
         <c:overlap val="100"/>
-        <c:axId val="215087824"/>
-        <c:axId val="215090624"/>
+        <c:axId val="155571824"/>
+        <c:axId val="155572384"/>
       </c:barChart>
       <c:catAx>
-        <c:axId val="215087824"/>
+        <c:axId val="155571824"/>
         <c:scaling>
           <c:orientation val="minMax"/>
         </c:scaling>
@@ -372,7 +399,7 @@
             <a:endParaRPr lang="it-IT"/>
           </a:p>
         </c:txPr>
-        <c:crossAx val="215090624"/>
+        <c:crossAx val="155572384"/>
         <c:crosses val="autoZero"/>
         <c:auto val="1"/>
         <c:lblAlgn val="ctr"/>
@@ -380,7 +407,7 @@
         <c:noMultiLvlLbl val="0"/>
       </c:catAx>
       <c:valAx>
-        <c:axId val="215090624"/>
+        <c:axId val="155572384"/>
         <c:scaling>
           <c:orientation val="minMax"/>
         </c:scaling>
@@ -404,7 +431,7 @@
         <c:majorTickMark val="none"/>
         <c:minorTickMark val="none"/>
         <c:tickLblPos val="nextTo"/>
-        <c:crossAx val="215087824"/>
+        <c:crossAx val="155571824"/>
         <c:crosses val="autoZero"/>
         <c:crossBetween val="between"/>
       </c:valAx>
@@ -1064,7 +1091,7 @@
           <a:p>
             <a:fld id="{BDB7646E-8811-423A-9C42-2CBFADA00A96}" type="datetimeFigureOut">
               <a:rPr lang="en-US" smtClean="0"/>
-              <a:t>4/17/2018</a:t>
+              <a:t>4/20/2018</a:t>
             </a:fld>
             <a:endParaRPr lang="en-US"/>
           </a:p>
@@ -1238,7 +1265,7 @@
             <a:fld id="{D677E230-58DD-43ED-96A1-552DDAB53532}" type="datetimeFigureOut">
               <a:rPr lang="en-US" smtClean="0"/>
               <a:pPr/>
-              <a:t>4/17/2018</a:t>
+              <a:t>4/20/2018</a:t>
             </a:fld>
             <a:endParaRPr lang="en-US"/>
           </a:p>
@@ -2431,7 +2458,7 @@
             <a:fld id="{C2C6F8EA-316C-41DE-B9A4-EDCC3A85ED9A}" type="datetimeFigureOut">
               <a:rPr lang="en-US" smtClean="0"/>
               <a:pPr/>
-              <a:t>4/17/2018</a:t>
+              <a:t>4/20/2018</a:t>
             </a:fld>
             <a:endParaRPr lang="en-US" dirty="0"/>
           </a:p>
@@ -2655,7 +2682,7 @@
           <a:p>
             <a:fld id="{C2C6F8EA-316C-41DE-B9A4-EDCC3A85ED9A}" type="datetimeFigureOut">
               <a:rPr lang="en-US"/>
-              <a:t>4/17/2018</a:t>
+              <a:t>4/20/2018</a:t>
             </a:fld>
             <a:endParaRPr/>
           </a:p>
@@ -3474,7 +3501,7 @@
           <a:p>
             <a:fld id="{C2C6F8EA-316C-41DE-B9A4-EDCC3A85ED9A}" type="datetimeFigureOut">
               <a:rPr lang="en-US"/>
-              <a:t>4/17/2018</a:t>
+              <a:t>4/20/2018</a:t>
             </a:fld>
             <a:endParaRPr/>
           </a:p>
@@ -3676,7 +3703,7 @@
           <a:p>
             <a:fld id="{C2C6F8EA-316C-41DE-B9A4-EDCC3A85ED9A}" type="datetimeFigureOut">
               <a:rPr lang="en-US"/>
-              <a:t>4/17/2018</a:t>
+              <a:t>4/20/2018</a:t>
             </a:fld>
             <a:endParaRPr dirty="0"/>
           </a:p>
@@ -4943,7 +4970,7 @@
             <a:fld id="{C2C6F8EA-316C-41DE-B9A4-EDCC3A85ED9A}" type="datetimeFigureOut">
               <a:rPr lang="en-US" smtClean="0"/>
               <a:pPr/>
-              <a:t>4/17/2018</a:t>
+              <a:t>4/20/2018</a:t>
             </a:fld>
             <a:endParaRPr lang="en-US" dirty="0"/>
           </a:p>
@@ -5269,7 +5296,7 @@
           <a:p>
             <a:fld id="{C2C6F8EA-316C-41DE-B9A4-EDCC3A85ED9A}" type="datetimeFigureOut">
               <a:rPr lang="en-US"/>
-              <a:t>4/17/2018</a:t>
+              <a:t>4/20/2018</a:t>
             </a:fld>
             <a:endParaRPr/>
           </a:p>
@@ -5721,7 +5748,7 @@
           <a:p>
             <a:fld id="{C2C6F8EA-316C-41DE-B9A4-EDCC3A85ED9A}" type="datetimeFigureOut">
               <a:rPr lang="en-US"/>
-              <a:t>4/17/2018</a:t>
+              <a:t>4/20/2018</a:t>
             </a:fld>
             <a:endParaRPr/>
           </a:p>
@@ -5855,7 +5882,7 @@
           <a:p>
             <a:fld id="{C2C6F8EA-316C-41DE-B9A4-EDCC3A85ED9A}" type="datetimeFigureOut">
               <a:rPr lang="en-US"/>
-              <a:t>4/17/2018</a:t>
+              <a:t>4/20/2018</a:t>
             </a:fld>
             <a:endParaRPr/>
           </a:p>
@@ -6194,7 +6221,7 @@
           <a:p>
             <a:fld id="{C2C6F8EA-316C-41DE-B9A4-EDCC3A85ED9A}" type="datetimeFigureOut">
               <a:rPr lang="en-US"/>
-              <a:t>4/17/2018</a:t>
+              <a:t>4/20/2018</a:t>
             </a:fld>
             <a:endParaRPr/>
           </a:p>
@@ -6690,7 +6717,7 @@
           <a:p>
             <a:fld id="{C2C6F8EA-316C-41DE-B9A4-EDCC3A85ED9A}" type="datetimeFigureOut">
               <a:rPr lang="en-US"/>
-              <a:t>4/17/2018</a:t>
+              <a:t>4/20/2018</a:t>
             </a:fld>
             <a:endParaRPr/>
           </a:p>
@@ -7143,7 +7170,7 @@
             <a:fld id="{C2C6F8EA-316C-41DE-B9A4-EDCC3A85ED9A}" type="datetimeFigureOut">
               <a:rPr lang="en-US" smtClean="0"/>
               <a:pPr/>
-              <a:t>4/17/2018</a:t>
+              <a:t>4/20/2018</a:t>
             </a:fld>
             <a:endParaRPr lang="en-US" dirty="0"/>
           </a:p>
@@ -8046,7 +8073,7 @@
             <a:fld id="{C2C6F8EA-316C-41DE-B9A4-EDCC3A85ED9A}" type="datetimeFigureOut">
               <a:rPr lang="en-US" smtClean="0"/>
               <a:pPr/>
-              <a:t>4/17/2018</a:t>
+              <a:t>4/20/2018</a:t>
             </a:fld>
             <a:endParaRPr lang="en-US" dirty="0"/>
           </a:p>
@@ -8670,11 +8697,7 @@
             </a:r>
             <a:r>
               <a:rPr lang="en-US" dirty="0" smtClean="0"/>
-              <a:t> – </a:t>
-            </a:r>
-            <a:r>
-              <a:rPr lang="en-US" dirty="0" smtClean="0"/>
-              <a:t>performance results</a:t>
+              <a:t> – performance results</a:t>
             </a:r>
             <a:endParaRPr lang="en-US" dirty="0"/>
           </a:p>
@@ -8807,7 +8830,7 @@
           <p:nvPr>
             <p:extLst>
               <p:ext uri="{D42A27DB-BD31-4B8C-83A1-F6EECF244321}">
-                <p14:modId xmlns:p14="http://schemas.microsoft.com/office/powerpoint/2010/main" val="164938881"/>
+                <p14:modId xmlns:p14="http://schemas.microsoft.com/office/powerpoint/2010/main" val="2548115239"/>
               </p:ext>
             </p:extLst>
           </p:nvPr>
@@ -8942,21 +8965,21 @@
                 <a:gridCol w="756560">
                   <a:extLst>
                     <a:ext uri="{9D8B030D-6E8A-4147-A177-3AD203B41FA5}">
-                      <a16:colId xmlns:a16="http://schemas.microsoft.com/office/drawing/2014/main" xmlns="" val="20000"/>
+                      <a16:colId xmlns="" xmlns:a16="http://schemas.microsoft.com/office/drawing/2014/main" val="20000"/>
                     </a:ext>
                   </a:extLst>
                 </a:gridCol>
                 <a:gridCol w="1584176">
                   <a:extLst>
                     <a:ext uri="{9D8B030D-6E8A-4147-A177-3AD203B41FA5}">
-                      <a16:colId xmlns:a16="http://schemas.microsoft.com/office/drawing/2014/main" xmlns="" val="20001"/>
+                      <a16:colId xmlns="" xmlns:a16="http://schemas.microsoft.com/office/drawing/2014/main" val="20001"/>
                     </a:ext>
                   </a:extLst>
                 </a:gridCol>
                 <a:gridCol w="1584479">
                   <a:extLst>
                     <a:ext uri="{9D8B030D-6E8A-4147-A177-3AD203B41FA5}">
-                      <a16:colId xmlns:a16="http://schemas.microsoft.com/office/drawing/2014/main" xmlns="" val="20002"/>
+                      <a16:colId xmlns="" xmlns:a16="http://schemas.microsoft.com/office/drawing/2014/main" val="20002"/>
                     </a:ext>
                   </a:extLst>
                 </a:gridCol>
@@ -9015,7 +9038,7 @@
                 </a:tc>
                 <a:extLst>
                   <a:ext uri="{0D108BD9-81ED-4DB2-BD59-A6C34878D82A}">
-                    <a16:rowId xmlns:a16="http://schemas.microsoft.com/office/drawing/2014/main" xmlns="" val="10000"/>
+                    <a16:rowId xmlns="" xmlns:a16="http://schemas.microsoft.com/office/drawing/2014/main" val="10000"/>
                   </a:ext>
                 </a:extLst>
               </a:tr>
@@ -9090,7 +9113,7 @@
                 </a:tc>
                 <a:extLst>
                   <a:ext uri="{0D108BD9-81ED-4DB2-BD59-A6C34878D82A}">
-                    <a16:rowId xmlns:a16="http://schemas.microsoft.com/office/drawing/2014/main" xmlns="" val="10001"/>
+                    <a16:rowId xmlns="" xmlns:a16="http://schemas.microsoft.com/office/drawing/2014/main" val="10001"/>
                   </a:ext>
                 </a:extLst>
               </a:tr>
@@ -9165,7 +9188,7 @@
                 </a:tc>
                 <a:extLst>
                   <a:ext uri="{0D108BD9-81ED-4DB2-BD59-A6C34878D82A}">
-                    <a16:rowId xmlns:a16="http://schemas.microsoft.com/office/drawing/2014/main" xmlns="" val="10002"/>
+                    <a16:rowId xmlns="" xmlns:a16="http://schemas.microsoft.com/office/drawing/2014/main" val="10002"/>
                   </a:ext>
                 </a:extLst>
               </a:tr>
@@ -9240,7 +9263,7 @@
                 </a:tc>
                 <a:extLst>
                   <a:ext uri="{0D108BD9-81ED-4DB2-BD59-A6C34878D82A}">
-                    <a16:rowId xmlns:a16="http://schemas.microsoft.com/office/drawing/2014/main" xmlns="" val="10003"/>
+                    <a16:rowId xmlns="" xmlns:a16="http://schemas.microsoft.com/office/drawing/2014/main" val="10003"/>
                   </a:ext>
                 </a:extLst>
               </a:tr>
@@ -10055,15 +10078,7 @@
                 <a:ea typeface="Cambria Math" panose="02040503050406030204" pitchFamily="18" charset="0"/>
                 <a:cs typeface="Consolas" panose="020B0609020204030204" pitchFamily="49" charset="0"/>
               </a:rPr>
-              <a:t>schurparlett</a:t>
-            </a:r>
-            <a:r>
-              <a:rPr lang="it-IT" sz="2400" dirty="0" smtClean="0">
-                <a:latin typeface="Consolas" panose="020B0609020204030204" pitchFamily="49" charset="0"/>
-                <a:ea typeface="Cambria Math" panose="02040503050406030204" pitchFamily="18" charset="0"/>
-                <a:cs typeface="Consolas" panose="020B0609020204030204" pitchFamily="49" charset="0"/>
-              </a:rPr>
-              <a:t>((x)-&gt;x^(1/3), A)</a:t>
+              <a:t>schurparlett((x)-&gt;x^(1/3), A)</a:t>
             </a:r>
             <a:endParaRPr lang="en-US" sz="2400" dirty="0" smtClean="0">
               <a:latin typeface="Consolas" panose="020B0609020204030204" pitchFamily="49" charset="0"/>
@@ -10312,8 +10327,8 @@
           </a:fontRef>
         </p:style>
       </p:cxnSp>
-      <mc:AlternateContent xmlns:mc="http://schemas.openxmlformats.org/markup-compatibility/2006">
-        <mc:Choice xmlns:a14="http://schemas.microsoft.com/office/drawing/2010/main" Requires="a14">
+      <mc:AlternateContent xmlns:mc="http://schemas.openxmlformats.org/markup-compatibility/2006" xmlns:a14="http://schemas.microsoft.com/office/drawing/2010/main">
+        <mc:Choice Requires="a14">
           <p:sp>
             <p:nvSpPr>
               <p:cNvPr id="11" name="Title 1"/>
@@ -10377,7 +10392,7 @@
             </p:txBody>
           </p:sp>
         </mc:Choice>
-        <mc:Fallback>
+        <mc:Fallback xmlns="">
           <p:sp>
             <p:nvSpPr>
               <p:cNvPr id="11" name="Title 1"/>
@@ -10720,8 +10735,8 @@
           </a:p>
         </p:txBody>
       </p:sp>
-      <mc:AlternateContent xmlns:mc="http://schemas.openxmlformats.org/markup-compatibility/2006">
-        <mc:Choice xmlns:a14="http://schemas.microsoft.com/office/drawing/2010/main" Requires="a14">
+      <mc:AlternateContent xmlns:mc="http://schemas.openxmlformats.org/markup-compatibility/2006" xmlns:a14="http://schemas.microsoft.com/office/drawing/2010/main">
+        <mc:Choice Requires="a14">
           <p:sp>
             <p:nvSpPr>
               <p:cNvPr id="14" name="Content Placeholder 13"/>
@@ -12153,7 +12168,7 @@
             </p:txBody>
           </p:sp>
         </mc:Choice>
-        <mc:Fallback>
+        <mc:Fallback xmlns="">
           <p:sp>
             <p:nvSpPr>
               <p:cNvPr id="14" name="Content Placeholder 13"/>
@@ -12545,8 +12560,8 @@
           </a:p>
         </p:txBody>
       </p:sp>
-      <mc:AlternateContent xmlns:mc="http://schemas.openxmlformats.org/markup-compatibility/2006">
-        <mc:Choice xmlns:a14="http://schemas.microsoft.com/office/drawing/2010/main" Requires="a14">
+      <mc:AlternateContent xmlns:mc="http://schemas.openxmlformats.org/markup-compatibility/2006" xmlns:a14="http://schemas.microsoft.com/office/drawing/2010/main">
+        <mc:Choice Requires="a14">
           <p:sp>
             <p:nvSpPr>
               <p:cNvPr id="14" name="Content Placeholder 13"/>
@@ -13401,7 +13416,7 @@
             </p:txBody>
           </p:sp>
         </mc:Choice>
-        <mc:Fallback>
+        <mc:Fallback xmlns="">
           <p:sp>
             <p:nvSpPr>
               <p:cNvPr id="14" name="Content Placeholder 13"/>
@@ -14096,8 +14111,8 @@
           </a:p>
         </p:txBody>
       </p:sp>
-      <mc:AlternateContent xmlns:mc="http://schemas.openxmlformats.org/markup-compatibility/2006">
-        <mc:Choice xmlns:a14="http://schemas.microsoft.com/office/drawing/2010/main" Requires="a14">
+      <mc:AlternateContent xmlns:mc="http://schemas.openxmlformats.org/markup-compatibility/2006" xmlns:a14="http://schemas.microsoft.com/office/drawing/2010/main">
+        <mc:Choice Requires="a14">
           <p:sp>
             <p:nvSpPr>
               <p:cNvPr id="5" name="Content Placeholder 13"/>
@@ -14180,7 +14195,6 @@
                   <a:rPr lang="en-US" dirty="0" smtClean="0"/>
                   <a:t>;</a:t>
                 </a:r>
-                <a:endParaRPr lang="en-US" dirty="0" smtClean="0"/>
               </a:p>
               <a:p>
                 <a:pPr marL="514350" indent="-514350">
@@ -14208,7 +14222,6 @@
                   <a:rPr lang="en-US" dirty="0" smtClean="0"/>
                   <a:t> with AAA;</a:t>
                 </a:r>
-                <a:endParaRPr lang="en-US" dirty="0" smtClean="0"/>
               </a:p>
               <a:p>
                 <a:pPr marL="514350" indent="-514350">
@@ -14220,11 +14233,7 @@
                 </a:pPr>
                 <a:r>
                   <a:rPr lang="en-US" dirty="0" smtClean="0"/>
-                  <a:t>Use the poles fo</a:t>
-                </a:r>
-                <a:r>
-                  <a:rPr lang="en-US" dirty="0" smtClean="0"/>
-                  <a:t>r the rational </a:t>
+                  <a:t>Use the poles for the rational </a:t>
                 </a:r>
                 <a:r>
                   <a:rPr lang="en-US" dirty="0" err="1" smtClean="0"/>
@@ -14234,7 +14243,6 @@
                   <a:rPr lang="en-US" dirty="0" smtClean="0"/>
                   <a:t> approximation.</a:t>
                 </a:r>
-                <a:endParaRPr lang="en-US" dirty="0" smtClean="0"/>
               </a:p>
               <a:p>
                 <a:pPr marL="0" indent="0">
@@ -14469,7 +14477,7 @@
             </p:txBody>
           </p:sp>
         </mc:Choice>
-        <mc:Fallback>
+        <mc:Fallback xmlns="">
           <p:sp>
             <p:nvSpPr>
               <p:cNvPr id="5" name="Content Placeholder 13"/>
@@ -14607,8 +14615,8 @@
           </a:p>
         </p:txBody>
       </p:sp>
-      <mc:AlternateContent xmlns:mc="http://schemas.openxmlformats.org/markup-compatibility/2006">
-        <mc:Choice xmlns:a14="http://schemas.microsoft.com/office/drawing/2010/main" Requires="a14">
+      <mc:AlternateContent xmlns:mc="http://schemas.openxmlformats.org/markup-compatibility/2006" xmlns:a14="http://schemas.microsoft.com/office/drawing/2010/main">
+        <mc:Choice Requires="a14">
           <p:sp>
             <p:nvSpPr>
               <p:cNvPr id="14" name="Content Placeholder 13"/>
@@ -14761,7 +14769,7 @@
             </p:txBody>
           </p:sp>
         </mc:Choice>
-        <mc:Fallback>
+        <mc:Fallback xmlns="">
           <p:sp>
             <p:nvSpPr>
               <p:cNvPr id="14" name="Content Placeholder 13"/>
@@ -14827,14 +14835,14 @@
                 <a:gridCol w="1205934">
                   <a:extLst>
                     <a:ext uri="{9D8B030D-6E8A-4147-A177-3AD203B41FA5}">
-                      <a16:colId xmlns:a16="http://schemas.microsoft.com/office/drawing/2014/main" xmlns="" val="20001"/>
+                      <a16:colId xmlns="" xmlns:a16="http://schemas.microsoft.com/office/drawing/2014/main" val="20001"/>
                     </a:ext>
                   </a:extLst>
                 </a:gridCol>
                 <a:gridCol w="1206162">
                   <a:extLst>
                     <a:ext uri="{9D8B030D-6E8A-4147-A177-3AD203B41FA5}">
-                      <a16:colId xmlns:a16="http://schemas.microsoft.com/office/drawing/2014/main" xmlns="" val="20002"/>
+                      <a16:colId xmlns="" xmlns:a16="http://schemas.microsoft.com/office/drawing/2014/main" val="20002"/>
                     </a:ext>
                   </a:extLst>
                 </a:gridCol>
@@ -14979,7 +14987,7 @@
                 </a:tc>
                 <a:extLst>
                   <a:ext uri="{0D108BD9-81ED-4DB2-BD59-A6C34878D82A}">
-                    <a16:rowId xmlns:a16="http://schemas.microsoft.com/office/drawing/2014/main" xmlns="" val="10000"/>
+                    <a16:rowId xmlns="" xmlns:a16="http://schemas.microsoft.com/office/drawing/2014/main" val="10000"/>
                   </a:ext>
                 </a:extLst>
               </a:tr>
@@ -15166,7 +15174,7 @@
                 </a:tc>
                 <a:extLst>
                   <a:ext uri="{0D108BD9-81ED-4DB2-BD59-A6C34878D82A}">
-                    <a16:rowId xmlns:a16="http://schemas.microsoft.com/office/drawing/2014/main" xmlns="" val="10001"/>
+                    <a16:rowId xmlns="" xmlns:a16="http://schemas.microsoft.com/office/drawing/2014/main" val="10001"/>
                   </a:ext>
                 </a:extLst>
               </a:tr>
@@ -15353,7 +15361,7 @@
                 </a:tc>
                 <a:extLst>
                   <a:ext uri="{0D108BD9-81ED-4DB2-BD59-A6C34878D82A}">
-                    <a16:rowId xmlns:a16="http://schemas.microsoft.com/office/drawing/2014/main" xmlns="" val="10002"/>
+                    <a16:rowId xmlns="" xmlns:a16="http://schemas.microsoft.com/office/drawing/2014/main" val="10002"/>
                   </a:ext>
                 </a:extLst>
               </a:tr>
@@ -15551,7 +15559,7 @@
                 </a:tc>
                 <a:extLst>
                   <a:ext uri="{0D108BD9-81ED-4DB2-BD59-A6C34878D82A}">
-                    <a16:rowId xmlns:a16="http://schemas.microsoft.com/office/drawing/2014/main" xmlns="" val="10003"/>
+                    <a16:rowId xmlns="" xmlns:a16="http://schemas.microsoft.com/office/drawing/2014/main" val="10003"/>
                   </a:ext>
                 </a:extLst>
               </a:tr>
@@ -15841,8 +15849,8 @@
           </a:p>
         </p:txBody>
       </p:sp>
-      <mc:AlternateContent xmlns:mc="http://schemas.openxmlformats.org/markup-compatibility/2006">
-        <mc:Choice xmlns:a14="http://schemas.microsoft.com/office/drawing/2010/main" Requires="a14">
+      <mc:AlternateContent xmlns:mc="http://schemas.openxmlformats.org/markup-compatibility/2006" xmlns:a14="http://schemas.microsoft.com/office/drawing/2010/main">
+        <mc:Choice Requires="a14">
           <p:sp>
             <p:nvSpPr>
               <p:cNvPr id="14" name="Content Placeholder 13"/>
@@ -15917,13 +15925,7 @@
                   <a:rPr lang="en-US" sz="2600" dirty="0" smtClean="0">
                     <a:sym typeface="Wingdings" panose="05000000000000000000" pitchFamily="2" charset="2"/>
                   </a:rPr>
-                  <a:t> </a:t>
-                </a:r>
-                <a:r>
-                  <a:rPr lang="en-US" sz="2600" dirty="0" smtClean="0">
-                    <a:sym typeface="Wingdings" panose="05000000000000000000" pitchFamily="2" charset="2"/>
-                  </a:rPr>
-                  <a:t>(positive definite </a:t>
+                  <a:t> (positive definite </a:t>
                 </a:r>
                 <a14:m>
                   <m:oMath xmlns:m="http://schemas.openxmlformats.org/officeDocument/2006/math">
@@ -15940,13 +15942,7 @@
                   <a:rPr lang="en-US" sz="2600" dirty="0" smtClean="0">
                     <a:sym typeface="Wingdings" panose="05000000000000000000" pitchFamily="2" charset="2"/>
                   </a:rPr>
-                  <a:t>)</a:t>
-                </a:r>
-                <a:r>
-                  <a:rPr lang="en-US" sz="2600" dirty="0" smtClean="0">
-                    <a:sym typeface="Wingdings" panose="05000000000000000000" pitchFamily="2" charset="2"/>
-                  </a:rPr>
-                  <a:t> against dense </a:t>
+                  <a:t>) against dense </a:t>
                 </a:r>
                 <a14:m>
                   <m:oMath xmlns:m="http://schemas.openxmlformats.org/officeDocument/2006/math">
@@ -15992,7 +15988,7 @@
             </p:txBody>
           </p:sp>
         </mc:Choice>
-        <mc:Fallback>
+        <mc:Fallback xmlns="">
           <p:sp>
             <p:nvSpPr>
               <p:cNvPr id="14" name="Content Placeholder 13"/>
@@ -16058,14 +16054,14 @@
                 <a:gridCol w="1205934">
                   <a:extLst>
                     <a:ext uri="{9D8B030D-6E8A-4147-A177-3AD203B41FA5}">
-                      <a16:colId xmlns:a16="http://schemas.microsoft.com/office/drawing/2014/main" xmlns="" val="20001"/>
+                      <a16:colId xmlns="" xmlns:a16="http://schemas.microsoft.com/office/drawing/2014/main" val="20001"/>
                     </a:ext>
                   </a:extLst>
                 </a:gridCol>
                 <a:gridCol w="1206162">
                   <a:extLst>
                     <a:ext uri="{9D8B030D-6E8A-4147-A177-3AD203B41FA5}">
-                      <a16:colId xmlns:a16="http://schemas.microsoft.com/office/drawing/2014/main" xmlns="" val="20002"/>
+                      <a16:colId xmlns="" xmlns:a16="http://schemas.microsoft.com/office/drawing/2014/main" val="20002"/>
                     </a:ext>
                   </a:extLst>
                 </a:gridCol>
@@ -16127,11 +16123,7 @@
                       </a:r>
                       <a:r>
                         <a:rPr lang="en-US" dirty="0" smtClean="0"/>
-                        <a:t>(A</a:t>
-                      </a:r>
-                      <a:r>
-                        <a:rPr lang="en-US" dirty="0" smtClean="0"/>
-                        <a:t>)</a:t>
+                        <a:t>(A)</a:t>
                       </a:r>
                       <a:endParaRPr lang="en-US" dirty="0"/>
                     </a:p>
@@ -16146,11 +16138,7 @@
                       <a:pPr algn="ctr"/>
                       <a:r>
                         <a:rPr lang="it-IT" dirty="0" smtClean="0"/>
-                        <a:t>norm(A</a:t>
-                      </a:r>
-                      <a:r>
-                        <a:rPr lang="it-IT" dirty="0" smtClean="0"/>
-                        <a:t>)</a:t>
+                        <a:t>norm(A)</a:t>
                       </a:r>
                       <a:endParaRPr lang="it-IT" dirty="0"/>
                     </a:p>
@@ -16219,7 +16207,7 @@
                 </a:tc>
                 <a:extLst>
                   <a:ext uri="{0D108BD9-81ED-4DB2-BD59-A6C34878D82A}">
-                    <a16:rowId xmlns:a16="http://schemas.microsoft.com/office/drawing/2014/main" xmlns="" val="10000"/>
+                    <a16:rowId xmlns="" xmlns:a16="http://schemas.microsoft.com/office/drawing/2014/main" val="10000"/>
                   </a:ext>
                 </a:extLst>
               </a:tr>
@@ -16465,7 +16453,7 @@
                 </a:tc>
                 <a:extLst>
                   <a:ext uri="{0D108BD9-81ED-4DB2-BD59-A6C34878D82A}">
-                    <a16:rowId xmlns:a16="http://schemas.microsoft.com/office/drawing/2014/main" xmlns="" val="10001"/>
+                    <a16:rowId xmlns="" xmlns:a16="http://schemas.microsoft.com/office/drawing/2014/main" val="10001"/>
                   </a:ext>
                 </a:extLst>
               </a:tr>
@@ -16719,7 +16707,7 @@
                 </a:tc>
                 <a:extLst>
                   <a:ext uri="{0D108BD9-81ED-4DB2-BD59-A6C34878D82A}">
-                    <a16:rowId xmlns:a16="http://schemas.microsoft.com/office/drawing/2014/main" xmlns="" val="10002"/>
+                    <a16:rowId xmlns="" xmlns:a16="http://schemas.microsoft.com/office/drawing/2014/main" val="10002"/>
                   </a:ext>
                 </a:extLst>
               </a:tr>
@@ -16756,13 +16744,6 @@
                         </a:rPr>
                         <a:t>Power network</a:t>
                       </a:r>
-                      <a:endParaRPr lang="en-US" dirty="0" smtClean="0">
-                        <a:solidFill>
-                          <a:schemeClr val="tx1"/>
-                        </a:solidFill>
-                        <a:latin typeface="Cambria Math" panose="02040503050406030204" pitchFamily="18" charset="0"/>
-                        <a:ea typeface="Cambria Math" panose="02040503050406030204" pitchFamily="18" charset="0"/>
-                      </a:endParaRPr>
                     </a:p>
                   </a:txBody>
                   <a:tcPr anchor="ctr"/>
@@ -16958,7 +16939,7 @@
                 </a:tc>
                 <a:extLst>
                   <a:ext uri="{0D108BD9-81ED-4DB2-BD59-A6C34878D82A}">
-                    <a16:rowId xmlns:a16="http://schemas.microsoft.com/office/drawing/2014/main" xmlns="" val="10003"/>
+                    <a16:rowId xmlns="" xmlns:a16="http://schemas.microsoft.com/office/drawing/2014/main" val="10003"/>
                   </a:ext>
                 </a:extLst>
               </a:tr>
@@ -17210,8 +17191,8 @@
           </a:graphicData>
         </a:graphic>
       </p:graphicFrame>
-      <mc:AlternateContent xmlns:mc="http://schemas.openxmlformats.org/markup-compatibility/2006">
-        <mc:Choice xmlns:a14="http://schemas.microsoft.com/office/drawing/2010/main" Requires="a14">
+      <mc:AlternateContent xmlns:mc="http://schemas.openxmlformats.org/markup-compatibility/2006" xmlns:a14="http://schemas.microsoft.com/office/drawing/2010/main">
+        <mc:Choice Requires="a14">
           <p:sp>
             <p:nvSpPr>
               <p:cNvPr id="5" name="Content Placeholder 13"/>
@@ -17513,12 +17494,11 @@
                   <a:rPr lang="en-US" sz="2600" dirty="0" smtClean="0"/>
                   <a:t>.</a:t>
                 </a:r>
-                <a:endParaRPr lang="en-US" sz="2600" dirty="0" smtClean="0"/>
               </a:p>
             </p:txBody>
           </p:sp>
         </mc:Choice>
-        <mc:Fallback>
+        <mc:Fallback xmlns="">
           <p:sp>
             <p:nvSpPr>
               <p:cNvPr id="5" name="Content Placeholder 13"/>
@@ -19301,8 +19281,8 @@
           </a:p>
         </p:txBody>
       </p:sp>
-      <mc:AlternateContent xmlns:mc="http://schemas.openxmlformats.org/markup-compatibility/2006" xmlns:a14="http://schemas.microsoft.com/office/drawing/2010/main">
-        <mc:Choice Requires="a14">
+      <mc:AlternateContent xmlns:mc="http://schemas.openxmlformats.org/markup-compatibility/2006">
+        <mc:Choice xmlns:a14="http://schemas.microsoft.com/office/drawing/2010/main" Requires="a14">
           <p:sp>
             <p:nvSpPr>
               <p:cNvPr id="14" name="Content Placeholder 13"/>
@@ -19486,7 +19466,15 @@
                 </a:r>
                 <a:r>
                   <a:rPr lang="en-US" dirty="0" smtClean="0"/>
-                  <a:t>requiring no other information form the user 	(such as derivatives of </a:t>
+                  <a:t>requiring no other information </a:t>
+                </a:r>
+                <a:r>
+                  <a:rPr lang="en-US" dirty="0" smtClean="0"/>
+                  <a:t>from </a:t>
+                </a:r>
+                <a:r>
+                  <a:rPr lang="en-US" dirty="0" smtClean="0"/>
+                  <a:t>the user 	(such as derivatives of </a:t>
                 </a:r>
                 <a14:m>
                   <m:oMath xmlns:m="http://schemas.openxmlformats.org/officeDocument/2006/math">
@@ -19507,7 +19495,7 @@
             </p:txBody>
           </p:sp>
         </mc:Choice>
-        <mc:Fallback xmlns="">
+        <mc:Fallback>
           <p:sp>
             <p:nvSpPr>
               <p:cNvPr id="14" name="Content Placeholder 13"/>
@@ -23999,7 +23987,7 @@
         <p:spPr>
           <a:xfrm>
             <a:off x="1593435" y="5661248"/>
-            <a:ext cx="9782801" cy="1196752"/>
+            <a:ext cx="10070834" cy="1196752"/>
           </a:xfrm>
           <a:prstGeom prst="rect">
             <a:avLst/>
@@ -24191,7 +24179,15 @@
             </a:r>
             <a:r>
               <a:rPr lang="en-US" sz="2600" dirty="0" smtClean="0"/>
-              <a:t> recurrence with real Sylvester equations, ~2x </a:t>
+              <a:t> recurrence </a:t>
+            </a:r>
+            <a:r>
+              <a:rPr lang="en-US" sz="2600" dirty="0" smtClean="0"/>
+              <a:t>in real arithmetic, ~</a:t>
+            </a:r>
+            <a:r>
+              <a:rPr lang="en-US" sz="2600" dirty="0" smtClean="0"/>
+              <a:t>2x </a:t>
             </a:r>
             <a:r>
               <a:rPr lang="en-US" sz="2600" dirty="0"/>

</xml_diff>